<commit_message>
Updated orthovoltage integration data flow (task list) based on Chandra's changes.
Explanation of the discrepancies between his edits and mine:
1. He added a box about visualize/adapt, which I think is part of the plan creation (External Beam Planning UI and looking at the beam in 3D)
2. He added a box for generating the .egsinp input file, which I intended as the Beam geometry and Engine parameters boxes, and the arrow to the DOSXYZnrc.
</commit_message>
<xml_diff>
--- a/technical/OrthovoltageRT_DataFlowDiagram.pptx
+++ b/technical/OrthovoltageRT_DataFlowDiagram.pptx
@@ -5,7 +5,8 @@
     <p:sldMasterId id="2147483648" r:id="rId1"/>
   </p:sldMasterIdLst>
   <p:sldIdLst>
-    <p:sldId id="256" r:id="rId2"/>
+    <p:sldId id="257" r:id="rId2"/>
+    <p:sldId id="256" r:id="rId3"/>
   </p:sldIdLst>
   <p:sldSz cx="12192000" cy="6858000"/>
   <p:notesSz cx="6858000" cy="9144000"/>
@@ -263,7 +264,7 @@
           <a:p>
             <a:fld id="{A3EF5248-34C8-48E4-B907-781D24C2C984}" type="datetimeFigureOut">
               <a:rPr lang="en-US" smtClean="0"/>
-              <a:t>2017-09-22</a:t>
+              <a:t>2017-11-16</a:t>
             </a:fld>
             <a:endParaRPr lang="en-US"/>
           </a:p>
@@ -461,7 +462,7 @@
           <a:p>
             <a:fld id="{A3EF5248-34C8-48E4-B907-781D24C2C984}" type="datetimeFigureOut">
               <a:rPr lang="en-US" smtClean="0"/>
-              <a:t>2017-09-22</a:t>
+              <a:t>2017-11-16</a:t>
             </a:fld>
             <a:endParaRPr lang="en-US"/>
           </a:p>
@@ -669,7 +670,7 @@
           <a:p>
             <a:fld id="{A3EF5248-34C8-48E4-B907-781D24C2C984}" type="datetimeFigureOut">
               <a:rPr lang="en-US" smtClean="0"/>
-              <a:t>2017-09-22</a:t>
+              <a:t>2017-11-16</a:t>
             </a:fld>
             <a:endParaRPr lang="en-US"/>
           </a:p>
@@ -867,7 +868,7 @@
           <a:p>
             <a:fld id="{A3EF5248-34C8-48E4-B907-781D24C2C984}" type="datetimeFigureOut">
               <a:rPr lang="en-US" smtClean="0"/>
-              <a:t>2017-09-22</a:t>
+              <a:t>2017-11-16</a:t>
             </a:fld>
             <a:endParaRPr lang="en-US"/>
           </a:p>
@@ -1142,7 +1143,7 @@
           <a:p>
             <a:fld id="{A3EF5248-34C8-48E4-B907-781D24C2C984}" type="datetimeFigureOut">
               <a:rPr lang="en-US" smtClean="0"/>
-              <a:t>2017-09-22</a:t>
+              <a:t>2017-11-16</a:t>
             </a:fld>
             <a:endParaRPr lang="en-US"/>
           </a:p>
@@ -1407,7 +1408,7 @@
           <a:p>
             <a:fld id="{A3EF5248-34C8-48E4-B907-781D24C2C984}" type="datetimeFigureOut">
               <a:rPr lang="en-US" smtClean="0"/>
-              <a:t>2017-09-22</a:t>
+              <a:t>2017-11-16</a:t>
             </a:fld>
             <a:endParaRPr lang="en-US"/>
           </a:p>
@@ -1819,7 +1820,7 @@
           <a:p>
             <a:fld id="{A3EF5248-34C8-48E4-B907-781D24C2C984}" type="datetimeFigureOut">
               <a:rPr lang="en-US" smtClean="0"/>
-              <a:t>2017-09-22</a:t>
+              <a:t>2017-11-16</a:t>
             </a:fld>
             <a:endParaRPr lang="en-US"/>
           </a:p>
@@ -1960,7 +1961,7 @@
           <a:p>
             <a:fld id="{A3EF5248-34C8-48E4-B907-781D24C2C984}" type="datetimeFigureOut">
               <a:rPr lang="en-US" smtClean="0"/>
-              <a:t>2017-09-22</a:t>
+              <a:t>2017-11-16</a:t>
             </a:fld>
             <a:endParaRPr lang="en-US"/>
           </a:p>
@@ -2073,7 +2074,7 @@
           <a:p>
             <a:fld id="{A3EF5248-34C8-48E4-B907-781D24C2C984}" type="datetimeFigureOut">
               <a:rPr lang="en-US" smtClean="0"/>
-              <a:t>2017-09-22</a:t>
+              <a:t>2017-11-16</a:t>
             </a:fld>
             <a:endParaRPr lang="en-US"/>
           </a:p>
@@ -2384,7 +2385,7 @@
           <a:p>
             <a:fld id="{A3EF5248-34C8-48E4-B907-781D24C2C984}" type="datetimeFigureOut">
               <a:rPr lang="en-US" smtClean="0"/>
-              <a:t>2017-09-22</a:t>
+              <a:t>2017-11-16</a:t>
             </a:fld>
             <a:endParaRPr lang="en-US"/>
           </a:p>
@@ -2672,7 +2673,7 @@
           <a:p>
             <a:fld id="{A3EF5248-34C8-48E4-B907-781D24C2C984}" type="datetimeFigureOut">
               <a:rPr lang="en-US" smtClean="0"/>
-              <a:t>2017-09-22</a:t>
+              <a:t>2017-11-16</a:t>
             </a:fld>
             <a:endParaRPr lang="en-US"/>
           </a:p>
@@ -2913,7 +2914,7 @@
           <a:p>
             <a:fld id="{A3EF5248-34C8-48E4-B907-781D24C2C984}" type="datetimeFigureOut">
               <a:rPr lang="en-US" smtClean="0"/>
-              <a:t>2017-09-22</a:t>
+              <a:t>2017-11-16</a:t>
             </a:fld>
             <a:endParaRPr lang="en-US"/>
           </a:p>
@@ -3344,8 +3345,8 @@
         </p:nvSpPr>
         <p:spPr>
           <a:xfrm>
-            <a:off x="2552362" y="1637464"/>
-            <a:ext cx="1707419" cy="1043872"/>
+            <a:off x="3219624" y="1646385"/>
+            <a:ext cx="1335901" cy="712979"/>
           </a:xfrm>
           <a:prstGeom prst="roundRect">
             <a:avLst/>
@@ -3392,8 +3393,8 @@
         </p:nvSpPr>
         <p:spPr>
           <a:xfrm>
-            <a:off x="7056592" y="3289412"/>
-            <a:ext cx="1707419" cy="1043872"/>
+            <a:off x="6924667" y="2952344"/>
+            <a:ext cx="1411090" cy="712979"/>
           </a:xfrm>
           <a:prstGeom prst="roundRect">
             <a:avLst/>
@@ -3440,8 +3441,8 @@
         </p:nvSpPr>
         <p:spPr>
           <a:xfrm>
-            <a:off x="2552361" y="3289412"/>
-            <a:ext cx="1707419" cy="1043872"/>
+            <a:off x="3219623" y="2952344"/>
+            <a:ext cx="1335901" cy="712979"/>
           </a:xfrm>
           <a:prstGeom prst="roundRect">
             <a:avLst/>
@@ -3488,8 +3489,8 @@
         </p:nvSpPr>
         <p:spPr>
           <a:xfrm>
-            <a:off x="592403" y="1551324"/>
-            <a:ext cx="1123108" cy="1216152"/>
+            <a:off x="1391473" y="1587550"/>
+            <a:ext cx="1123108" cy="830649"/>
           </a:xfrm>
           <a:prstGeom prst="can">
             <a:avLst/>
@@ -3531,6 +3532,7 @@
             </a:extLst>
           </p:cNvPr>
           <p:cNvCxnSpPr>
+            <a:cxnSpLocks/>
             <a:stCxn id="7" idx="4"/>
             <a:endCxn id="4" idx="1"/>
           </p:cNvCxnSpPr>
@@ -3538,8 +3540,8 @@
         </p:nvCxnSpPr>
         <p:spPr>
           <a:xfrm>
-            <a:off x="1715511" y="2159400"/>
-            <a:ext cx="836851" cy="0"/>
+            <a:off x="2514581" y="2002875"/>
+            <a:ext cx="705043" cy="0"/>
           </a:xfrm>
           <a:prstGeom prst="straightConnector1">
             <a:avLst/>
@@ -3577,8 +3579,8 @@
         </p:nvSpPr>
         <p:spPr>
           <a:xfrm>
-            <a:off x="5096632" y="1551324"/>
-            <a:ext cx="1123108" cy="1216152"/>
+            <a:off x="5195483" y="1587550"/>
+            <a:ext cx="1123108" cy="830649"/>
           </a:xfrm>
           <a:prstGeom prst="can">
             <a:avLst/>
@@ -3628,8 +3630,8 @@
         </p:nvCxnSpPr>
         <p:spPr>
           <a:xfrm>
-            <a:off x="4259781" y="2159400"/>
-            <a:ext cx="836851" cy="0"/>
+            <a:off x="4555525" y="2002875"/>
+            <a:ext cx="639958" cy="0"/>
           </a:xfrm>
           <a:prstGeom prst="straightConnector1">
             <a:avLst/>
@@ -3667,8 +3669,8 @@
         </p:nvSpPr>
         <p:spPr>
           <a:xfrm>
-            <a:off x="5096632" y="3203272"/>
-            <a:ext cx="1123108" cy="1216152"/>
+            <a:off x="5195483" y="2893509"/>
+            <a:ext cx="1123108" cy="830649"/>
           </a:xfrm>
           <a:prstGeom prst="can">
             <a:avLst/>
@@ -3718,8 +3720,8 @@
         </p:nvCxnSpPr>
         <p:spPr>
           <a:xfrm>
-            <a:off x="4259780" y="3811348"/>
-            <a:ext cx="836852" cy="0"/>
+            <a:off x="4555524" y="3308834"/>
+            <a:ext cx="639959" cy="0"/>
           </a:xfrm>
           <a:prstGeom prst="straightConnector1">
             <a:avLst/>
@@ -3757,8 +3759,8 @@
         </p:nvSpPr>
         <p:spPr>
           <a:xfrm>
-            <a:off x="602684" y="3203272"/>
-            <a:ext cx="1123108" cy="1216152"/>
+            <a:off x="1401754" y="2893509"/>
+            <a:ext cx="1123108" cy="830649"/>
           </a:xfrm>
           <a:prstGeom prst="can">
             <a:avLst/>
@@ -3801,15 +3803,15 @@
           </p:cNvPr>
           <p:cNvCxnSpPr>
             <a:cxnSpLocks/>
-            <a:stCxn id="20" idx="4"/>
-            <a:endCxn id="6" idx="1"/>
+            <a:stCxn id="37" idx="4"/>
+            <a:endCxn id="6" idx="2"/>
           </p:cNvCxnSpPr>
           <p:nvPr/>
         </p:nvCxnSpPr>
         <p:spPr>
-          <a:xfrm>
-            <a:off x="1725792" y="3811348"/>
-            <a:ext cx="826569" cy="0"/>
+          <a:xfrm flipV="1">
+            <a:off x="3428656" y="3665323"/>
+            <a:ext cx="458918" cy="603653"/>
           </a:xfrm>
           <a:prstGeom prst="straightConnector1">
             <a:avLst/>
@@ -3851,8 +3853,8 @@
         </p:nvCxnSpPr>
         <p:spPr>
           <a:xfrm>
-            <a:off x="6219740" y="3811348"/>
-            <a:ext cx="836852" cy="0"/>
+            <a:off x="6318591" y="3308834"/>
+            <a:ext cx="606076" cy="0"/>
           </a:xfrm>
           <a:prstGeom prst="straightConnector1">
             <a:avLst/>
@@ -3890,8 +3892,8 @@
         </p:nvSpPr>
         <p:spPr>
           <a:xfrm>
-            <a:off x="7348748" y="5055660"/>
-            <a:ext cx="1123108" cy="1216152"/>
+            <a:off x="6368440" y="4314456"/>
+            <a:ext cx="1123108" cy="913714"/>
           </a:xfrm>
           <a:prstGeom prst="can">
             <a:avLst/>
@@ -3935,14 +3937,13 @@
           <p:cNvCxnSpPr>
             <a:cxnSpLocks/>
             <a:stCxn id="28" idx="1"/>
-            <a:endCxn id="5" idx="2"/>
           </p:cNvCxnSpPr>
           <p:nvPr/>
         </p:nvCxnSpPr>
         <p:spPr>
           <a:xfrm flipV="1">
-            <a:off x="7910302" y="4333284"/>
-            <a:ext cx="0" cy="722376"/>
+            <a:off x="6929994" y="3643768"/>
+            <a:ext cx="406011" cy="670688"/>
           </a:xfrm>
           <a:prstGeom prst="straightConnector1">
             <a:avLst/>
@@ -3980,8 +3981,8 @@
         </p:nvSpPr>
         <p:spPr>
           <a:xfrm>
-            <a:off x="9600863" y="3203272"/>
-            <a:ext cx="1123108" cy="1216152"/>
+            <a:off x="9114825" y="2893509"/>
+            <a:ext cx="1123108" cy="830649"/>
           </a:xfrm>
           <a:prstGeom prst="can">
             <a:avLst/>
@@ -4038,8 +4039,8 @@
         </p:nvCxnSpPr>
         <p:spPr>
           <a:xfrm>
-            <a:off x="8764011" y="3811348"/>
-            <a:ext cx="836852" cy="0"/>
+            <a:off x="8335757" y="3308834"/>
+            <a:ext cx="779068" cy="0"/>
           </a:xfrm>
           <a:prstGeom prst="straightConnector1">
             <a:avLst/>
@@ -4081,8 +4082,8 @@
         </p:nvCxnSpPr>
         <p:spPr>
           <a:xfrm>
-            <a:off x="6219740" y="2159400"/>
-            <a:ext cx="1690562" cy="1130012"/>
+            <a:off x="6318591" y="2002875"/>
+            <a:ext cx="1311621" cy="949469"/>
           </a:xfrm>
           <a:prstGeom prst="straightConnector1">
             <a:avLst/>
@@ -4120,7 +4121,7 @@
         </p:nvSpPr>
         <p:spPr>
           <a:xfrm>
-            <a:off x="3054052" y="660056"/>
+            <a:off x="3535555" y="904265"/>
             <a:ext cx="704039" cy="369332"/>
           </a:xfrm>
           <a:prstGeom prst="rect">
@@ -4129,7 +4130,7 @@
           <a:noFill/>
         </p:spPr>
         <p:txBody>
-          <a:bodyPr wrap="none" rtlCol="0">
+          <a:bodyPr wrap="square" rtlCol="0">
             <a:spAutoFit/>
           </a:bodyPr>
           <a:lstStyle/>
@@ -4159,8 +4160,8 @@
         </p:nvCxnSpPr>
         <p:spPr>
           <a:xfrm>
-            <a:off x="3406072" y="1029388"/>
-            <a:ext cx="0" cy="608076"/>
+            <a:off x="3887575" y="1273597"/>
+            <a:ext cx="0" cy="372788"/>
           </a:xfrm>
           <a:prstGeom prst="straightConnector1">
             <a:avLst/>
@@ -4184,6 +4185,2152 @@
           </a:fontRef>
         </p:style>
       </p:cxnSp>
+      <p:sp>
+        <p:nvSpPr>
+          <p:cNvPr id="21" name="TextBox 20">
+            <a:extLst>
+              <a:ext uri="{FF2B5EF4-FFF2-40B4-BE49-F238E27FC236}">
+                <a16:creationId xmlns:a16="http://schemas.microsoft.com/office/drawing/2014/main" id="{39F471EC-B787-46F9-8291-42BC5FCF9035}"/>
+              </a:ext>
+            </a:extLst>
+          </p:cNvPr>
+          <p:cNvSpPr txBox="1"/>
+          <p:nvPr/>
+        </p:nvSpPr>
+        <p:spPr>
+          <a:xfrm>
+            <a:off x="2305548" y="51961"/>
+            <a:ext cx="7091300" cy="461665"/>
+          </a:xfrm>
+          <a:prstGeom prst="rect">
+            <a:avLst/>
+          </a:prstGeom>
+        </p:spPr>
+        <p:style>
+          <a:lnRef idx="2">
+            <a:schemeClr val="accent1"/>
+          </a:lnRef>
+          <a:fillRef idx="1">
+            <a:schemeClr val="lt1"/>
+          </a:fillRef>
+          <a:effectRef idx="0">
+            <a:schemeClr val="accent1"/>
+          </a:effectRef>
+          <a:fontRef idx="minor">
+            <a:schemeClr val="dk1"/>
+          </a:fontRef>
+        </p:style>
+        <p:txBody>
+          <a:bodyPr wrap="none" rtlCol="0">
+            <a:spAutoFit/>
+          </a:bodyPr>
+          <a:lstStyle/>
+          <a:p>
+            <a:r>
+              <a:rPr lang="en-US" sz="2400" dirty="0"/>
+              <a:t>Tasks (integration of </a:t>
+            </a:r>
+            <a:r>
+              <a:rPr lang="en-US" sz="2400" dirty="0" err="1"/>
+              <a:t>DOSXYZnrc</a:t>
+            </a:r>
+            <a:r>
+              <a:rPr lang="en-US" sz="2400" dirty="0"/>
+              <a:t> workflow into SlicerRT)</a:t>
+            </a:r>
+          </a:p>
+        </p:txBody>
+      </p:sp>
+      <p:sp>
+        <p:nvSpPr>
+          <p:cNvPr id="2" name="TextBox 1">
+            <a:extLst>
+              <a:ext uri="{FF2B5EF4-FFF2-40B4-BE49-F238E27FC236}">
+                <a16:creationId xmlns:a16="http://schemas.microsoft.com/office/drawing/2014/main" id="{6CE65134-BAF8-4E2E-9103-CDE0683DCC7B}"/>
+              </a:ext>
+            </a:extLst>
+          </p:cNvPr>
+          <p:cNvSpPr txBox="1"/>
+          <p:nvPr/>
+        </p:nvSpPr>
+        <p:spPr>
+          <a:xfrm>
+            <a:off x="5422017" y="1398669"/>
+            <a:ext cx="662746" cy="307777"/>
+          </a:xfrm>
+          <a:prstGeom prst="rect">
+            <a:avLst/>
+          </a:prstGeom>
+        </p:spPr>
+        <p:style>
+          <a:lnRef idx="0">
+            <a:schemeClr val="accent2"/>
+          </a:lnRef>
+          <a:fillRef idx="3">
+            <a:schemeClr val="accent2"/>
+          </a:fillRef>
+          <a:effectRef idx="3">
+            <a:schemeClr val="accent2"/>
+          </a:effectRef>
+          <a:fontRef idx="minor">
+            <a:schemeClr val="lt1"/>
+          </a:fontRef>
+        </p:style>
+        <p:txBody>
+          <a:bodyPr wrap="square" rtlCol="0">
+            <a:spAutoFit/>
+          </a:bodyPr>
+          <a:lstStyle/>
+          <a:p>
+            <a:pPr algn="ctr"/>
+            <a:r>
+              <a:rPr lang="en-US" sz="1400" dirty="0"/>
+              <a:t>CCSEO</a:t>
+            </a:r>
+          </a:p>
+        </p:txBody>
+      </p:sp>
+      <p:sp>
+        <p:nvSpPr>
+          <p:cNvPr id="36" name="Rectangle: Rounded Corners 35">
+            <a:extLst>
+              <a:ext uri="{FF2B5EF4-FFF2-40B4-BE49-F238E27FC236}">
+                <a16:creationId xmlns:a16="http://schemas.microsoft.com/office/drawing/2014/main" id="{1CC44823-041A-47AE-9A23-C0BA02E10C3F}"/>
+              </a:ext>
+            </a:extLst>
+          </p:cNvPr>
+          <p:cNvSpPr/>
+          <p:nvPr/>
+        </p:nvSpPr>
+        <p:spPr>
+          <a:xfrm>
+            <a:off x="5047845" y="5831470"/>
+            <a:ext cx="1411090" cy="712979"/>
+          </a:xfrm>
+          <a:prstGeom prst="roundRect">
+            <a:avLst/>
+          </a:prstGeom>
+          <a:ln w="38100">
+            <a:solidFill>
+              <a:srgbClr val="FF0000"/>
+            </a:solidFill>
+          </a:ln>
+        </p:spPr>
+        <p:style>
+          <a:lnRef idx="2">
+            <a:schemeClr val="dk1"/>
+          </a:lnRef>
+          <a:fillRef idx="1">
+            <a:schemeClr val="lt1"/>
+          </a:fillRef>
+          <a:effectRef idx="0">
+            <a:schemeClr val="dk1"/>
+          </a:effectRef>
+          <a:fontRef idx="minor">
+            <a:schemeClr val="dk1"/>
+          </a:fontRef>
+        </p:style>
+        <p:txBody>
+          <a:bodyPr rtlCol="0" anchor="ctr"/>
+          <a:lstStyle/>
+          <a:p>
+            <a:pPr algn="ctr"/>
+            <a:r>
+              <a:rPr lang="en-US" dirty="0"/>
+              <a:t>SlicerRT</a:t>
+            </a:r>
+          </a:p>
+        </p:txBody>
+      </p:sp>
+      <p:sp>
+        <p:nvSpPr>
+          <p:cNvPr id="37" name="Cylinder 36">
+            <a:extLst>
+              <a:ext uri="{FF2B5EF4-FFF2-40B4-BE49-F238E27FC236}">
+                <a16:creationId xmlns:a16="http://schemas.microsoft.com/office/drawing/2014/main" id="{7B9AC653-6710-4D6A-AC71-A0F780288508}"/>
+              </a:ext>
+            </a:extLst>
+          </p:cNvPr>
+          <p:cNvSpPr/>
+          <p:nvPr/>
+        </p:nvSpPr>
+        <p:spPr>
+          <a:xfrm>
+            <a:off x="2305548" y="3956937"/>
+            <a:ext cx="1123108" cy="624078"/>
+          </a:xfrm>
+          <a:prstGeom prst="can">
+            <a:avLst/>
+          </a:prstGeom>
+        </p:spPr>
+        <p:style>
+          <a:lnRef idx="2">
+            <a:schemeClr val="accent2"/>
+          </a:lnRef>
+          <a:fillRef idx="1">
+            <a:schemeClr val="lt1"/>
+          </a:fillRef>
+          <a:effectRef idx="0">
+            <a:schemeClr val="accent2"/>
+          </a:effectRef>
+          <a:fontRef idx="minor">
+            <a:schemeClr val="dk1"/>
+          </a:fontRef>
+        </p:style>
+        <p:txBody>
+          <a:bodyPr rtlCol="0" anchor="ctr"/>
+          <a:lstStyle/>
+          <a:p>
+            <a:pPr algn="ctr"/>
+            <a:r>
+              <a:rPr lang="en-US" dirty="0"/>
+              <a:t>File list</a:t>
+            </a:r>
+          </a:p>
+        </p:txBody>
+      </p:sp>
+      <p:cxnSp>
+        <p:nvCxnSpPr>
+          <p:cNvPr id="46" name="Connector: Elbow 45">
+            <a:extLst>
+              <a:ext uri="{FF2B5EF4-FFF2-40B4-BE49-F238E27FC236}">
+                <a16:creationId xmlns:a16="http://schemas.microsoft.com/office/drawing/2014/main" id="{5CDB45F3-C3D2-41C8-906F-5B418ADE0799}"/>
+              </a:ext>
+            </a:extLst>
+          </p:cNvPr>
+          <p:cNvCxnSpPr>
+            <a:cxnSpLocks/>
+            <a:stCxn id="20" idx="3"/>
+          </p:cNvCxnSpPr>
+          <p:nvPr/>
+        </p:nvCxnSpPr>
+        <p:spPr>
+          <a:xfrm rot="16200000" flipH="1">
+            <a:off x="2192944" y="3494522"/>
+            <a:ext cx="2627218" cy="3086490"/>
+          </a:xfrm>
+          <a:prstGeom prst="bentConnector2">
+            <a:avLst/>
+          </a:prstGeom>
+          <a:ln w="31750">
+            <a:solidFill>
+              <a:schemeClr val="tx1"/>
+            </a:solidFill>
+            <a:tailEnd type="triangle" w="lg" len="med"/>
+          </a:ln>
+        </p:spPr>
+        <p:style>
+          <a:lnRef idx="1">
+            <a:schemeClr val="accent1"/>
+          </a:lnRef>
+          <a:fillRef idx="0">
+            <a:schemeClr val="accent1"/>
+          </a:fillRef>
+          <a:effectRef idx="0">
+            <a:schemeClr val="accent1"/>
+          </a:effectRef>
+          <a:fontRef idx="minor">
+            <a:schemeClr val="tx1"/>
+          </a:fontRef>
+        </p:style>
+      </p:cxnSp>
+      <p:cxnSp>
+        <p:nvCxnSpPr>
+          <p:cNvPr id="47" name="Connector: Elbow 46">
+            <a:extLst>
+              <a:ext uri="{FF2B5EF4-FFF2-40B4-BE49-F238E27FC236}">
+                <a16:creationId xmlns:a16="http://schemas.microsoft.com/office/drawing/2014/main" id="{98ACCB15-FCCA-4E5A-B58F-670DEBF815DD}"/>
+              </a:ext>
+            </a:extLst>
+          </p:cNvPr>
+          <p:cNvCxnSpPr>
+            <a:cxnSpLocks/>
+            <a:endCxn id="37" idx="3"/>
+          </p:cNvCxnSpPr>
+          <p:nvPr/>
+        </p:nvCxnSpPr>
+        <p:spPr>
+          <a:xfrm rot="10800000">
+            <a:off x="2867103" y="4581016"/>
+            <a:ext cx="2166217" cy="1523223"/>
+          </a:xfrm>
+          <a:prstGeom prst="bentConnector2">
+            <a:avLst/>
+          </a:prstGeom>
+          <a:ln w="31750">
+            <a:solidFill>
+              <a:srgbClr val="FF0000"/>
+            </a:solidFill>
+            <a:tailEnd type="triangle" w="lg" len="med"/>
+          </a:ln>
+        </p:spPr>
+        <p:style>
+          <a:lnRef idx="1">
+            <a:schemeClr val="accent1"/>
+          </a:lnRef>
+          <a:fillRef idx="0">
+            <a:schemeClr val="accent1"/>
+          </a:fillRef>
+          <a:effectRef idx="0">
+            <a:schemeClr val="accent1"/>
+          </a:effectRef>
+          <a:fontRef idx="minor">
+            <a:schemeClr val="tx1"/>
+          </a:fontRef>
+        </p:style>
+      </p:cxnSp>
+      <p:cxnSp>
+        <p:nvCxnSpPr>
+          <p:cNvPr id="52" name="Connector: Elbow 51">
+            <a:extLst>
+              <a:ext uri="{FF2B5EF4-FFF2-40B4-BE49-F238E27FC236}">
+                <a16:creationId xmlns:a16="http://schemas.microsoft.com/office/drawing/2014/main" id="{BB8CD231-B3AB-4B49-A6B3-45C0C530DC5C}"/>
+              </a:ext>
+            </a:extLst>
+          </p:cNvPr>
+          <p:cNvCxnSpPr>
+            <a:cxnSpLocks/>
+          </p:cNvCxnSpPr>
+          <p:nvPr/>
+        </p:nvCxnSpPr>
+        <p:spPr>
+          <a:xfrm rot="16200000" flipV="1">
+            <a:off x="3372980" y="4301815"/>
+            <a:ext cx="2318652" cy="1045666"/>
+          </a:xfrm>
+          <a:prstGeom prst="bentConnector3">
+            <a:avLst>
+              <a:gd name="adj1" fmla="val -1872"/>
+            </a:avLst>
+          </a:prstGeom>
+          <a:ln w="31750">
+            <a:solidFill>
+              <a:srgbClr val="FF0000"/>
+            </a:solidFill>
+            <a:tailEnd type="triangle" w="lg" len="med"/>
+          </a:ln>
+        </p:spPr>
+        <p:style>
+          <a:lnRef idx="1">
+            <a:schemeClr val="accent1"/>
+          </a:lnRef>
+          <a:fillRef idx="0">
+            <a:schemeClr val="accent1"/>
+          </a:fillRef>
+          <a:effectRef idx="0">
+            <a:schemeClr val="accent1"/>
+          </a:effectRef>
+          <a:fontRef idx="minor">
+            <a:schemeClr val="tx1"/>
+          </a:fontRef>
+        </p:style>
+      </p:cxnSp>
+      <p:cxnSp>
+        <p:nvCxnSpPr>
+          <p:cNvPr id="60" name="Connector: Elbow 59">
+            <a:extLst>
+              <a:ext uri="{FF2B5EF4-FFF2-40B4-BE49-F238E27FC236}">
+                <a16:creationId xmlns:a16="http://schemas.microsoft.com/office/drawing/2014/main" id="{F120BF67-C40F-439B-8247-056D45D50C79}"/>
+              </a:ext>
+            </a:extLst>
+          </p:cNvPr>
+          <p:cNvCxnSpPr>
+            <a:cxnSpLocks/>
+            <a:endCxn id="28" idx="3"/>
+          </p:cNvCxnSpPr>
+          <p:nvPr/>
+        </p:nvCxnSpPr>
+        <p:spPr>
+          <a:xfrm rot="5400000" flipH="1" flipV="1">
+            <a:off x="6317067" y="5377332"/>
+            <a:ext cx="762088" cy="463765"/>
+          </a:xfrm>
+          <a:prstGeom prst="bentConnector3">
+            <a:avLst>
+              <a:gd name="adj1" fmla="val -6210"/>
+            </a:avLst>
+          </a:prstGeom>
+          <a:ln w="31750">
+            <a:solidFill>
+              <a:srgbClr val="FF0000"/>
+            </a:solidFill>
+            <a:tailEnd type="triangle" w="lg" len="med"/>
+          </a:ln>
+        </p:spPr>
+        <p:style>
+          <a:lnRef idx="1">
+            <a:schemeClr val="accent1"/>
+          </a:lnRef>
+          <a:fillRef idx="0">
+            <a:schemeClr val="accent1"/>
+          </a:fillRef>
+          <a:effectRef idx="0">
+            <a:schemeClr val="accent1"/>
+          </a:effectRef>
+          <a:fontRef idx="minor">
+            <a:schemeClr val="tx1"/>
+          </a:fontRef>
+        </p:style>
+      </p:cxnSp>
+      <p:sp>
+        <p:nvSpPr>
+          <p:cNvPr id="65" name="Cylinder 64">
+            <a:extLst>
+              <a:ext uri="{FF2B5EF4-FFF2-40B4-BE49-F238E27FC236}">
+                <a16:creationId xmlns:a16="http://schemas.microsoft.com/office/drawing/2014/main" id="{96459F2A-AA5C-4168-806E-418F42D45F60}"/>
+              </a:ext>
+            </a:extLst>
+          </p:cNvPr>
+          <p:cNvSpPr/>
+          <p:nvPr/>
+        </p:nvSpPr>
+        <p:spPr>
+          <a:xfrm>
+            <a:off x="7768079" y="4342979"/>
+            <a:ext cx="1358961" cy="885190"/>
+          </a:xfrm>
+          <a:prstGeom prst="can">
+            <a:avLst/>
+          </a:prstGeom>
+        </p:spPr>
+        <p:style>
+          <a:lnRef idx="2">
+            <a:schemeClr val="accent2"/>
+          </a:lnRef>
+          <a:fillRef idx="1">
+            <a:schemeClr val="lt1"/>
+          </a:fillRef>
+          <a:effectRef idx="0">
+            <a:schemeClr val="accent2"/>
+          </a:effectRef>
+          <a:fontRef idx="minor">
+            <a:schemeClr val="dk1"/>
+          </a:fontRef>
+        </p:style>
+        <p:txBody>
+          <a:bodyPr rtlCol="0" anchor="ctr"/>
+          <a:lstStyle/>
+          <a:p>
+            <a:pPr algn="ctr"/>
+            <a:r>
+              <a:rPr lang="en-US" dirty="0"/>
+              <a:t>Engine parameters</a:t>
+            </a:r>
+          </a:p>
+        </p:txBody>
+      </p:sp>
+      <p:cxnSp>
+        <p:nvCxnSpPr>
+          <p:cNvPr id="68" name="Connector: Elbow 67">
+            <a:extLst>
+              <a:ext uri="{FF2B5EF4-FFF2-40B4-BE49-F238E27FC236}">
+                <a16:creationId xmlns:a16="http://schemas.microsoft.com/office/drawing/2014/main" id="{33BBC124-D951-4D14-A446-C707F1E37CDA}"/>
+              </a:ext>
+            </a:extLst>
+          </p:cNvPr>
+          <p:cNvCxnSpPr>
+            <a:cxnSpLocks/>
+            <a:endCxn id="5" idx="2"/>
+          </p:cNvCxnSpPr>
+          <p:nvPr/>
+        </p:nvCxnSpPr>
+        <p:spPr>
+          <a:xfrm rot="5400000" flipH="1" flipV="1">
+            <a:off x="5833119" y="4307146"/>
+            <a:ext cx="2438915" cy="1155271"/>
+          </a:xfrm>
+          <a:prstGeom prst="bentConnector3">
+            <a:avLst>
+              <a:gd name="adj1" fmla="val -327"/>
+            </a:avLst>
+          </a:prstGeom>
+          <a:ln w="31750">
+            <a:solidFill>
+              <a:srgbClr val="FF0000"/>
+            </a:solidFill>
+            <a:tailEnd type="triangle" w="lg" len="med"/>
+          </a:ln>
+        </p:spPr>
+        <p:style>
+          <a:lnRef idx="1">
+            <a:schemeClr val="accent1"/>
+          </a:lnRef>
+          <a:fillRef idx="0">
+            <a:schemeClr val="accent1"/>
+          </a:fillRef>
+          <a:effectRef idx="0">
+            <a:schemeClr val="accent1"/>
+          </a:effectRef>
+          <a:fontRef idx="minor">
+            <a:schemeClr val="tx1"/>
+          </a:fontRef>
+        </p:style>
+      </p:cxnSp>
+      <p:cxnSp>
+        <p:nvCxnSpPr>
+          <p:cNvPr id="69" name="Straight Arrow Connector 68">
+            <a:extLst>
+              <a:ext uri="{FF2B5EF4-FFF2-40B4-BE49-F238E27FC236}">
+                <a16:creationId xmlns:a16="http://schemas.microsoft.com/office/drawing/2014/main" id="{8D8C389A-8288-4BFE-8734-372B16C773AD}"/>
+              </a:ext>
+            </a:extLst>
+          </p:cNvPr>
+          <p:cNvCxnSpPr>
+            <a:cxnSpLocks/>
+            <a:stCxn id="65" idx="1"/>
+          </p:cNvCxnSpPr>
+          <p:nvPr/>
+        </p:nvCxnSpPr>
+        <p:spPr>
+          <a:xfrm flipH="1" flipV="1">
+            <a:off x="7957280" y="3665322"/>
+            <a:ext cx="490280" cy="677657"/>
+          </a:xfrm>
+          <a:prstGeom prst="straightConnector1">
+            <a:avLst/>
+          </a:prstGeom>
+          <a:ln w="31750">
+            <a:tailEnd type="triangle" w="lg" len="med"/>
+          </a:ln>
+        </p:spPr>
+        <p:style>
+          <a:lnRef idx="1">
+            <a:schemeClr val="accent1"/>
+          </a:lnRef>
+          <a:fillRef idx="0">
+            <a:schemeClr val="accent1"/>
+          </a:fillRef>
+          <a:effectRef idx="0">
+            <a:schemeClr val="accent1"/>
+          </a:effectRef>
+          <a:fontRef idx="minor">
+            <a:schemeClr val="tx1"/>
+          </a:fontRef>
+        </p:style>
+      </p:cxnSp>
+      <p:sp>
+        <p:nvSpPr>
+          <p:cNvPr id="66" name="TextBox 65">
+            <a:extLst>
+              <a:ext uri="{FF2B5EF4-FFF2-40B4-BE49-F238E27FC236}">
+                <a16:creationId xmlns:a16="http://schemas.microsoft.com/office/drawing/2014/main" id="{2EE1C9AA-5881-4D54-9A37-B9525B43F1F2}"/>
+              </a:ext>
+            </a:extLst>
+          </p:cNvPr>
+          <p:cNvSpPr txBox="1"/>
+          <p:nvPr/>
+        </p:nvSpPr>
+        <p:spPr>
+          <a:xfrm>
+            <a:off x="8116599" y="4158542"/>
+            <a:ext cx="662746" cy="307777"/>
+          </a:xfrm>
+          <a:prstGeom prst="rect">
+            <a:avLst/>
+          </a:prstGeom>
+        </p:spPr>
+        <p:style>
+          <a:lnRef idx="0">
+            <a:schemeClr val="accent2"/>
+          </a:lnRef>
+          <a:fillRef idx="3">
+            <a:schemeClr val="accent2"/>
+          </a:fillRef>
+          <a:effectRef idx="3">
+            <a:schemeClr val="accent2"/>
+          </a:effectRef>
+          <a:fontRef idx="minor">
+            <a:schemeClr val="lt1"/>
+          </a:fontRef>
+        </p:style>
+        <p:txBody>
+          <a:bodyPr wrap="square" rtlCol="0">
+            <a:spAutoFit/>
+          </a:bodyPr>
+          <a:lstStyle/>
+          <a:p>
+            <a:pPr algn="ctr"/>
+            <a:r>
+              <a:rPr lang="en-US" sz="1400" dirty="0"/>
+              <a:t>CCSEO</a:t>
+            </a:r>
+          </a:p>
+        </p:txBody>
+      </p:sp>
+      <p:cxnSp>
+        <p:nvCxnSpPr>
+          <p:cNvPr id="79" name="Connector: Elbow 78">
+            <a:extLst>
+              <a:ext uri="{FF2B5EF4-FFF2-40B4-BE49-F238E27FC236}">
+                <a16:creationId xmlns:a16="http://schemas.microsoft.com/office/drawing/2014/main" id="{FC088389-6B37-4281-B2C1-DD8A9BE26B8A}"/>
+              </a:ext>
+            </a:extLst>
+          </p:cNvPr>
+          <p:cNvCxnSpPr>
+            <a:cxnSpLocks/>
+            <a:stCxn id="32" idx="3"/>
+          </p:cNvCxnSpPr>
+          <p:nvPr/>
+        </p:nvCxnSpPr>
+        <p:spPr>
+          <a:xfrm rot="5400000">
+            <a:off x="6745576" y="3437047"/>
+            <a:ext cx="2643693" cy="3217914"/>
+          </a:xfrm>
+          <a:prstGeom prst="bentConnector2">
+            <a:avLst/>
+          </a:prstGeom>
+          <a:ln w="31750">
+            <a:solidFill>
+              <a:schemeClr val="tx1"/>
+            </a:solidFill>
+            <a:tailEnd type="triangle" w="lg" len="med"/>
+          </a:ln>
+        </p:spPr>
+        <p:style>
+          <a:lnRef idx="1">
+            <a:schemeClr val="accent1"/>
+          </a:lnRef>
+          <a:fillRef idx="0">
+            <a:schemeClr val="accent1"/>
+          </a:fillRef>
+          <a:effectRef idx="0">
+            <a:schemeClr val="accent1"/>
+          </a:effectRef>
+          <a:fontRef idx="minor">
+            <a:schemeClr val="tx1"/>
+          </a:fontRef>
+        </p:style>
+      </p:cxnSp>
+      <p:cxnSp>
+        <p:nvCxnSpPr>
+          <p:cNvPr id="89" name="Connector: Elbow 88">
+            <a:extLst>
+              <a:ext uri="{FF2B5EF4-FFF2-40B4-BE49-F238E27FC236}">
+                <a16:creationId xmlns:a16="http://schemas.microsoft.com/office/drawing/2014/main" id="{4242FF7F-00D7-4DB3-8D5B-BE0F2A5B2876}"/>
+              </a:ext>
+            </a:extLst>
+          </p:cNvPr>
+          <p:cNvCxnSpPr>
+            <a:cxnSpLocks/>
+            <a:stCxn id="36" idx="3"/>
+            <a:endCxn id="65" idx="3"/>
+          </p:cNvCxnSpPr>
+          <p:nvPr/>
+        </p:nvCxnSpPr>
+        <p:spPr>
+          <a:xfrm flipV="1">
+            <a:off x="6458935" y="5228169"/>
+            <a:ext cx="1988625" cy="959791"/>
+          </a:xfrm>
+          <a:prstGeom prst="bentConnector2">
+            <a:avLst/>
+          </a:prstGeom>
+          <a:ln w="31750">
+            <a:solidFill>
+              <a:srgbClr val="FF0000"/>
+            </a:solidFill>
+            <a:tailEnd type="triangle" w="lg" len="med"/>
+          </a:ln>
+        </p:spPr>
+        <p:style>
+          <a:lnRef idx="1">
+            <a:schemeClr val="accent1"/>
+          </a:lnRef>
+          <a:fillRef idx="0">
+            <a:schemeClr val="accent1"/>
+          </a:fillRef>
+          <a:effectRef idx="0">
+            <a:schemeClr val="accent1"/>
+          </a:effectRef>
+          <a:fontRef idx="minor">
+            <a:schemeClr val="tx1"/>
+          </a:fontRef>
+        </p:style>
+      </p:cxnSp>
+      <p:sp>
+        <p:nvSpPr>
+          <p:cNvPr id="63" name="TextBox 62">
+            <a:extLst>
+              <a:ext uri="{FF2B5EF4-FFF2-40B4-BE49-F238E27FC236}">
+                <a16:creationId xmlns:a16="http://schemas.microsoft.com/office/drawing/2014/main" id="{7211B544-B9EB-4636-B898-5B68127BFAC4}"/>
+              </a:ext>
+            </a:extLst>
+          </p:cNvPr>
+          <p:cNvSpPr txBox="1"/>
+          <p:nvPr/>
+        </p:nvSpPr>
+        <p:spPr>
+          <a:xfrm>
+            <a:off x="6605914" y="5950033"/>
+            <a:ext cx="662746" cy="307777"/>
+          </a:xfrm>
+          <a:prstGeom prst="rect">
+            <a:avLst/>
+          </a:prstGeom>
+          <a:solidFill>
+            <a:srgbClr val="800000"/>
+          </a:solidFill>
+        </p:spPr>
+        <p:style>
+          <a:lnRef idx="0">
+            <a:schemeClr val="accent2"/>
+          </a:lnRef>
+          <a:fillRef idx="3">
+            <a:schemeClr val="accent2"/>
+          </a:fillRef>
+          <a:effectRef idx="3">
+            <a:schemeClr val="accent2"/>
+          </a:effectRef>
+          <a:fontRef idx="minor">
+            <a:schemeClr val="lt1"/>
+          </a:fontRef>
+        </p:style>
+        <p:txBody>
+          <a:bodyPr wrap="square" rtlCol="0">
+            <a:spAutoFit/>
+          </a:bodyPr>
+          <a:lstStyle/>
+          <a:p>
+            <a:pPr algn="ctr"/>
+            <a:r>
+              <a:rPr lang="en-US" sz="1400" dirty="0"/>
+              <a:t>Perk</a:t>
+            </a:r>
+          </a:p>
+        </p:txBody>
+      </p:sp>
+      <p:sp>
+        <p:nvSpPr>
+          <p:cNvPr id="3" name="TextBox 2">
+            <a:extLst>
+              <a:ext uri="{FF2B5EF4-FFF2-40B4-BE49-F238E27FC236}">
+                <a16:creationId xmlns:a16="http://schemas.microsoft.com/office/drawing/2014/main" id="{3929AAC1-2695-4D36-AEAA-1AD512E3277B}"/>
+              </a:ext>
+            </a:extLst>
+          </p:cNvPr>
+          <p:cNvSpPr txBox="1"/>
+          <p:nvPr/>
+        </p:nvSpPr>
+        <p:spPr>
+          <a:xfrm>
+            <a:off x="1520278" y="5485936"/>
+            <a:ext cx="484428" cy="276999"/>
+          </a:xfrm>
+          <a:prstGeom prst="rect">
+            <a:avLst/>
+          </a:prstGeom>
+          <a:noFill/>
+        </p:spPr>
+        <p:txBody>
+          <a:bodyPr wrap="none" rtlCol="0">
+            <a:spAutoFit/>
+          </a:bodyPr>
+          <a:lstStyle/>
+          <a:p>
+            <a:r>
+              <a:rPr lang="en-US" sz="1200" dirty="0"/>
+              <a:t>Load</a:t>
+            </a:r>
+          </a:p>
+        </p:txBody>
+      </p:sp>
+      <p:sp>
+        <p:nvSpPr>
+          <p:cNvPr id="41" name="TextBox 40">
+            <a:extLst>
+              <a:ext uri="{FF2B5EF4-FFF2-40B4-BE49-F238E27FC236}">
+                <a16:creationId xmlns:a16="http://schemas.microsoft.com/office/drawing/2014/main" id="{BB18DDB0-B3C8-44EC-97CC-CA68D3202299}"/>
+              </a:ext>
+            </a:extLst>
+          </p:cNvPr>
+          <p:cNvSpPr txBox="1"/>
+          <p:nvPr/>
+        </p:nvSpPr>
+        <p:spPr>
+          <a:xfrm>
+            <a:off x="2821885" y="5485936"/>
+            <a:ext cx="765146" cy="276999"/>
+          </a:xfrm>
+          <a:prstGeom prst="rect">
+            <a:avLst/>
+          </a:prstGeom>
+          <a:noFill/>
+        </p:spPr>
+        <p:txBody>
+          <a:bodyPr wrap="none" rtlCol="0">
+            <a:spAutoFit/>
+          </a:bodyPr>
+          <a:lstStyle/>
+          <a:p>
+            <a:r>
+              <a:rPr lang="en-US" sz="1200" dirty="0"/>
+              <a:t>Generate</a:t>
+            </a:r>
+          </a:p>
+        </p:txBody>
+      </p:sp>
+      <p:sp>
+        <p:nvSpPr>
+          <p:cNvPr id="42" name="TextBox 41">
+            <a:extLst>
+              <a:ext uri="{FF2B5EF4-FFF2-40B4-BE49-F238E27FC236}">
+                <a16:creationId xmlns:a16="http://schemas.microsoft.com/office/drawing/2014/main" id="{F4940096-5380-4375-8649-E2746C398B31}"/>
+              </a:ext>
+            </a:extLst>
+          </p:cNvPr>
+          <p:cNvSpPr txBox="1"/>
+          <p:nvPr/>
+        </p:nvSpPr>
+        <p:spPr>
+          <a:xfrm>
+            <a:off x="3963061" y="4035432"/>
+            <a:ext cx="410690" cy="276999"/>
+          </a:xfrm>
+          <a:prstGeom prst="rect">
+            <a:avLst/>
+          </a:prstGeom>
+          <a:noFill/>
+        </p:spPr>
+        <p:txBody>
+          <a:bodyPr wrap="none" rtlCol="0">
+            <a:spAutoFit/>
+          </a:bodyPr>
+          <a:lstStyle/>
+          <a:p>
+            <a:r>
+              <a:rPr lang="en-US" sz="1200" dirty="0"/>
+              <a:t>Call</a:t>
+            </a:r>
+          </a:p>
+        </p:txBody>
+      </p:sp>
+      <p:sp>
+        <p:nvSpPr>
+          <p:cNvPr id="48" name="TextBox 47">
+            <a:extLst>
+              <a:ext uri="{FF2B5EF4-FFF2-40B4-BE49-F238E27FC236}">
+                <a16:creationId xmlns:a16="http://schemas.microsoft.com/office/drawing/2014/main" id="{1F38E203-BA67-45B5-9457-B50EC3511EC6}"/>
+              </a:ext>
+            </a:extLst>
+          </p:cNvPr>
+          <p:cNvSpPr txBox="1"/>
+          <p:nvPr/>
+        </p:nvSpPr>
+        <p:spPr>
+          <a:xfrm>
+            <a:off x="6212680" y="5485936"/>
+            <a:ext cx="765146" cy="276999"/>
+          </a:xfrm>
+          <a:prstGeom prst="rect">
+            <a:avLst/>
+          </a:prstGeom>
+          <a:noFill/>
+        </p:spPr>
+        <p:txBody>
+          <a:bodyPr wrap="none" rtlCol="0">
+            <a:spAutoFit/>
+          </a:bodyPr>
+          <a:lstStyle/>
+          <a:p>
+            <a:r>
+              <a:rPr lang="en-US" sz="1200" dirty="0"/>
+              <a:t>Generate</a:t>
+            </a:r>
+          </a:p>
+        </p:txBody>
+      </p:sp>
+      <p:sp>
+        <p:nvSpPr>
+          <p:cNvPr id="49" name="TextBox 48">
+            <a:extLst>
+              <a:ext uri="{FF2B5EF4-FFF2-40B4-BE49-F238E27FC236}">
+                <a16:creationId xmlns:a16="http://schemas.microsoft.com/office/drawing/2014/main" id="{2FF3DC3D-E0F2-40D8-85CF-06F96065F33B}"/>
+              </a:ext>
+            </a:extLst>
+          </p:cNvPr>
+          <p:cNvSpPr txBox="1"/>
+          <p:nvPr/>
+        </p:nvSpPr>
+        <p:spPr>
+          <a:xfrm>
+            <a:off x="7034962" y="5391062"/>
+            <a:ext cx="950901" cy="461665"/>
+          </a:xfrm>
+          <a:prstGeom prst="rect">
+            <a:avLst/>
+          </a:prstGeom>
+          <a:noFill/>
+        </p:spPr>
+        <p:txBody>
+          <a:bodyPr wrap="none" rtlCol="0">
+            <a:spAutoFit/>
+          </a:bodyPr>
+          <a:lstStyle/>
+          <a:p>
+            <a:r>
+              <a:rPr lang="en-US" sz="1200"/>
+              <a:t>       Call</a:t>
+            </a:r>
+            <a:br>
+              <a:rPr lang="en-US" sz="1200" dirty="0"/>
+            </a:br>
+            <a:r>
+              <a:rPr lang="en-US" sz="1200" dirty="0"/>
+              <a:t>(.</a:t>
+            </a:r>
+            <a:r>
+              <a:rPr lang="en-US" sz="1200" dirty="0" err="1"/>
+              <a:t>egsinp</a:t>
+            </a:r>
+            <a:r>
+              <a:rPr lang="en-US" sz="1200" dirty="0"/>
+              <a:t> file)</a:t>
+            </a:r>
+          </a:p>
+        </p:txBody>
+      </p:sp>
+      <p:sp>
+        <p:nvSpPr>
+          <p:cNvPr id="50" name="TextBox 49">
+            <a:extLst>
+              <a:ext uri="{FF2B5EF4-FFF2-40B4-BE49-F238E27FC236}">
+                <a16:creationId xmlns:a16="http://schemas.microsoft.com/office/drawing/2014/main" id="{8DDB8BF2-5CF6-4894-AA82-E31482DD67C8}"/>
+              </a:ext>
+            </a:extLst>
+          </p:cNvPr>
+          <p:cNvSpPr txBox="1"/>
+          <p:nvPr/>
+        </p:nvSpPr>
+        <p:spPr>
+          <a:xfrm>
+            <a:off x="8409898" y="5485936"/>
+            <a:ext cx="765146" cy="276999"/>
+          </a:xfrm>
+          <a:prstGeom prst="rect">
+            <a:avLst/>
+          </a:prstGeom>
+          <a:noFill/>
+        </p:spPr>
+        <p:txBody>
+          <a:bodyPr wrap="none" rtlCol="0">
+            <a:spAutoFit/>
+          </a:bodyPr>
+          <a:lstStyle/>
+          <a:p>
+            <a:r>
+              <a:rPr lang="en-US" sz="1200" dirty="0"/>
+              <a:t>Generate</a:t>
+            </a:r>
+          </a:p>
+        </p:txBody>
+      </p:sp>
+      <p:sp>
+        <p:nvSpPr>
+          <p:cNvPr id="54" name="TextBox 53">
+            <a:extLst>
+              <a:ext uri="{FF2B5EF4-FFF2-40B4-BE49-F238E27FC236}">
+                <a16:creationId xmlns:a16="http://schemas.microsoft.com/office/drawing/2014/main" id="{5FFBCF32-2DF7-4B43-B585-49BEB0B024A1}"/>
+              </a:ext>
+            </a:extLst>
+          </p:cNvPr>
+          <p:cNvSpPr txBox="1"/>
+          <p:nvPr/>
+        </p:nvSpPr>
+        <p:spPr>
+          <a:xfrm>
+            <a:off x="9642642" y="5485936"/>
+            <a:ext cx="484428" cy="276999"/>
+          </a:xfrm>
+          <a:prstGeom prst="rect">
+            <a:avLst/>
+          </a:prstGeom>
+          <a:noFill/>
+        </p:spPr>
+        <p:txBody>
+          <a:bodyPr wrap="none" rtlCol="0">
+            <a:spAutoFit/>
+          </a:bodyPr>
+          <a:lstStyle/>
+          <a:p>
+            <a:r>
+              <a:rPr lang="en-US" sz="1200" dirty="0"/>
+              <a:t>Load</a:t>
+            </a:r>
+          </a:p>
+        </p:txBody>
+      </p:sp>
+      <p:sp>
+        <p:nvSpPr>
+          <p:cNvPr id="56" name="TextBox 55">
+            <a:extLst>
+              <a:ext uri="{FF2B5EF4-FFF2-40B4-BE49-F238E27FC236}">
+                <a16:creationId xmlns:a16="http://schemas.microsoft.com/office/drawing/2014/main" id="{A4BCCB2C-2459-4E8B-B535-0BA3BBFB920A}"/>
+              </a:ext>
+            </a:extLst>
+          </p:cNvPr>
+          <p:cNvSpPr txBox="1"/>
+          <p:nvPr/>
+        </p:nvSpPr>
+        <p:spPr>
+          <a:xfrm>
+            <a:off x="1623905" y="1398668"/>
+            <a:ext cx="662746" cy="307777"/>
+          </a:xfrm>
+          <a:prstGeom prst="rect">
+            <a:avLst/>
+          </a:prstGeom>
+        </p:spPr>
+        <p:style>
+          <a:lnRef idx="0">
+            <a:schemeClr val="accent2"/>
+          </a:lnRef>
+          <a:fillRef idx="3">
+            <a:schemeClr val="accent2"/>
+          </a:fillRef>
+          <a:effectRef idx="3">
+            <a:schemeClr val="accent2"/>
+          </a:effectRef>
+          <a:fontRef idx="minor">
+            <a:schemeClr val="lt1"/>
+          </a:fontRef>
+        </p:style>
+        <p:txBody>
+          <a:bodyPr wrap="square" rtlCol="0">
+            <a:spAutoFit/>
+          </a:bodyPr>
+          <a:lstStyle/>
+          <a:p>
+            <a:pPr algn="ctr"/>
+            <a:r>
+              <a:rPr lang="en-US" sz="1400" dirty="0"/>
+              <a:t>CCSEO</a:t>
+            </a:r>
+          </a:p>
+        </p:txBody>
+      </p:sp>
+      <p:sp>
+        <p:nvSpPr>
+          <p:cNvPr id="51" name="TextBox 50">
+            <a:extLst>
+              <a:ext uri="{FF2B5EF4-FFF2-40B4-BE49-F238E27FC236}">
+                <a16:creationId xmlns:a16="http://schemas.microsoft.com/office/drawing/2014/main" id="{EAE59DC8-537C-4EE4-A860-8CC929616F9C}"/>
+              </a:ext>
+            </a:extLst>
+          </p:cNvPr>
+          <p:cNvSpPr txBox="1"/>
+          <p:nvPr/>
+        </p:nvSpPr>
+        <p:spPr>
+          <a:xfrm>
+            <a:off x="3687920" y="5887751"/>
+            <a:ext cx="662746" cy="307777"/>
+          </a:xfrm>
+          <a:prstGeom prst="rect">
+            <a:avLst/>
+          </a:prstGeom>
+          <a:solidFill>
+            <a:srgbClr val="800000"/>
+          </a:solidFill>
+        </p:spPr>
+        <p:style>
+          <a:lnRef idx="0">
+            <a:schemeClr val="accent2"/>
+          </a:lnRef>
+          <a:fillRef idx="3">
+            <a:schemeClr val="accent2"/>
+          </a:fillRef>
+          <a:effectRef idx="3">
+            <a:schemeClr val="accent2"/>
+          </a:effectRef>
+          <a:fontRef idx="minor">
+            <a:schemeClr val="lt1"/>
+          </a:fontRef>
+        </p:style>
+        <p:txBody>
+          <a:bodyPr wrap="square" rtlCol="0">
+            <a:spAutoFit/>
+          </a:bodyPr>
+          <a:lstStyle/>
+          <a:p>
+            <a:pPr algn="ctr"/>
+            <a:r>
+              <a:rPr lang="en-US" sz="1400" dirty="0"/>
+              <a:t>Perk</a:t>
+            </a:r>
+          </a:p>
+        </p:txBody>
+      </p:sp>
+      <p:sp>
+        <p:nvSpPr>
+          <p:cNvPr id="64" name="Cylinder 63">
+            <a:extLst>
+              <a:ext uri="{FF2B5EF4-FFF2-40B4-BE49-F238E27FC236}">
+                <a16:creationId xmlns:a16="http://schemas.microsoft.com/office/drawing/2014/main" id="{A10CEB88-1280-4601-92BF-5239B007286F}"/>
+              </a:ext>
+            </a:extLst>
+          </p:cNvPr>
+          <p:cNvSpPr/>
+          <p:nvPr/>
+        </p:nvSpPr>
+        <p:spPr>
+          <a:xfrm>
+            <a:off x="4467663" y="4434571"/>
+            <a:ext cx="928188" cy="686486"/>
+          </a:xfrm>
+          <a:prstGeom prst="can">
+            <a:avLst/>
+          </a:prstGeom>
+        </p:spPr>
+        <p:style>
+          <a:lnRef idx="2">
+            <a:schemeClr val="accent2"/>
+          </a:lnRef>
+          <a:fillRef idx="1">
+            <a:schemeClr val="lt1"/>
+          </a:fillRef>
+          <a:effectRef idx="0">
+            <a:schemeClr val="accent2"/>
+          </a:effectRef>
+          <a:fontRef idx="minor">
+            <a:schemeClr val="dk1"/>
+          </a:fontRef>
+        </p:style>
+        <p:txBody>
+          <a:bodyPr rtlCol="0" anchor="ctr"/>
+          <a:lstStyle/>
+          <a:p>
+            <a:pPr algn="ctr"/>
+            <a:r>
+              <a:rPr lang="en-US" dirty="0"/>
+              <a:t>Plan</a:t>
+            </a:r>
+          </a:p>
+        </p:txBody>
+      </p:sp>
+      <p:cxnSp>
+        <p:nvCxnSpPr>
+          <p:cNvPr id="67" name="Connector: Elbow 66">
+            <a:extLst>
+              <a:ext uri="{FF2B5EF4-FFF2-40B4-BE49-F238E27FC236}">
+                <a16:creationId xmlns:a16="http://schemas.microsoft.com/office/drawing/2014/main" id="{750FB407-1FDF-4F7E-BC4E-26C6EB195672}"/>
+              </a:ext>
+            </a:extLst>
+          </p:cNvPr>
+          <p:cNvCxnSpPr>
+            <a:cxnSpLocks/>
+            <a:stCxn id="64" idx="3"/>
+            <a:endCxn id="36" idx="0"/>
+          </p:cNvCxnSpPr>
+          <p:nvPr/>
+        </p:nvCxnSpPr>
+        <p:spPr>
+          <a:xfrm rot="16200000" flipH="1">
+            <a:off x="4987367" y="5065446"/>
+            <a:ext cx="710413" cy="821633"/>
+          </a:xfrm>
+          <a:prstGeom prst="bentConnector3">
+            <a:avLst>
+              <a:gd name="adj1" fmla="val 50000"/>
+            </a:avLst>
+          </a:prstGeom>
+          <a:ln w="31750">
+            <a:solidFill>
+              <a:schemeClr val="tx1"/>
+            </a:solidFill>
+            <a:tailEnd type="triangle" w="lg" len="med"/>
+          </a:ln>
+        </p:spPr>
+        <p:style>
+          <a:lnRef idx="1">
+            <a:schemeClr val="accent1"/>
+          </a:lnRef>
+          <a:fillRef idx="0">
+            <a:schemeClr val="accent1"/>
+          </a:fillRef>
+          <a:effectRef idx="0">
+            <a:schemeClr val="accent1"/>
+          </a:effectRef>
+          <a:fontRef idx="minor">
+            <a:schemeClr val="tx1"/>
+          </a:fontRef>
+        </p:style>
+      </p:cxnSp>
+      <p:sp>
+        <p:nvSpPr>
+          <p:cNvPr id="70" name="TextBox 69">
+            <a:extLst>
+              <a:ext uri="{FF2B5EF4-FFF2-40B4-BE49-F238E27FC236}">
+                <a16:creationId xmlns:a16="http://schemas.microsoft.com/office/drawing/2014/main" id="{66B3C141-090E-4413-8F83-48A3B7B08C65}"/>
+              </a:ext>
+            </a:extLst>
+          </p:cNvPr>
+          <p:cNvSpPr txBox="1"/>
+          <p:nvPr/>
+        </p:nvSpPr>
+        <p:spPr>
+          <a:xfrm>
+            <a:off x="4290626" y="5228169"/>
+            <a:ext cx="1745799" cy="276999"/>
+          </a:xfrm>
+          <a:prstGeom prst="rect">
+            <a:avLst/>
+          </a:prstGeom>
+          <a:noFill/>
+        </p:spPr>
+        <p:txBody>
+          <a:bodyPr wrap="none" rtlCol="0">
+            <a:spAutoFit/>
+          </a:bodyPr>
+          <a:lstStyle/>
+          <a:p>
+            <a:r>
+              <a:rPr lang="en-US" sz="1200" dirty="0"/>
+              <a:t>Create +  Visualize/Adapt</a:t>
+            </a:r>
+          </a:p>
+        </p:txBody>
+      </p:sp>
+    </p:spTree>
+    <p:extLst>
+      <p:ext uri="{BB962C8B-B14F-4D97-AF65-F5344CB8AC3E}">
+        <p14:creationId xmlns:p14="http://schemas.microsoft.com/office/powerpoint/2010/main" val="3980293402"/>
+      </p:ext>
+    </p:extLst>
+  </p:cSld>
+  <p:clrMapOvr>
+    <a:masterClrMapping/>
+  </p:clrMapOvr>
+</p:sld>
+</file>
+
+<file path=ppt/slides/slide2.xml><?xml version="1.0" encoding="utf-8"?>
+<p:sld xmlns:a="http://schemas.openxmlformats.org/drawingml/2006/main" xmlns:r="http://schemas.openxmlformats.org/officeDocument/2006/relationships" xmlns:p="http://schemas.openxmlformats.org/presentationml/2006/main">
+  <p:cSld>
+    <p:spTree>
+      <p:nvGrpSpPr>
+        <p:cNvPr id="1" name=""/>
+        <p:cNvGrpSpPr/>
+        <p:nvPr/>
+      </p:nvGrpSpPr>
+      <p:grpSpPr>
+        <a:xfrm>
+          <a:off x="0" y="0"/>
+          <a:ext cx="0" cy="0"/>
+          <a:chOff x="0" y="0"/>
+          <a:chExt cx="0" cy="0"/>
+        </a:xfrm>
+      </p:grpSpPr>
+      <p:sp>
+        <p:nvSpPr>
+          <p:cNvPr id="4" name="Rectangle: Rounded Corners 3">
+            <a:extLst>
+              <a:ext uri="{FF2B5EF4-FFF2-40B4-BE49-F238E27FC236}">
+                <a16:creationId xmlns:a16="http://schemas.microsoft.com/office/drawing/2014/main" id="{6098AE2E-2D1E-4E37-A79C-9CF5664F4419}"/>
+              </a:ext>
+            </a:extLst>
+          </p:cNvPr>
+          <p:cNvSpPr/>
+          <p:nvPr/>
+        </p:nvSpPr>
+        <p:spPr>
+          <a:xfrm>
+            <a:off x="2717122" y="1744558"/>
+            <a:ext cx="1707419" cy="1043873"/>
+          </a:xfrm>
+          <a:prstGeom prst="roundRect">
+            <a:avLst/>
+          </a:prstGeom>
+        </p:spPr>
+        <p:style>
+          <a:lnRef idx="2">
+            <a:schemeClr val="accent1"/>
+          </a:lnRef>
+          <a:fillRef idx="1">
+            <a:schemeClr val="lt1"/>
+          </a:fillRef>
+          <a:effectRef idx="0">
+            <a:schemeClr val="accent1"/>
+          </a:effectRef>
+          <a:fontRef idx="minor">
+            <a:schemeClr val="dk1"/>
+          </a:fontRef>
+        </p:style>
+        <p:txBody>
+          <a:bodyPr rtlCol="0" anchor="ctr"/>
+          <a:lstStyle/>
+          <a:p>
+            <a:pPr algn="ctr"/>
+            <a:r>
+              <a:rPr lang="en-US" dirty="0" err="1"/>
+              <a:t>BEAMnrc</a:t>
+            </a:r>
+            <a:endParaRPr lang="en-US" dirty="0"/>
+          </a:p>
+        </p:txBody>
+      </p:sp>
+      <p:sp>
+        <p:nvSpPr>
+          <p:cNvPr id="5" name="Rectangle: Rounded Corners 4">
+            <a:extLst>
+              <a:ext uri="{FF2B5EF4-FFF2-40B4-BE49-F238E27FC236}">
+                <a16:creationId xmlns:a16="http://schemas.microsoft.com/office/drawing/2014/main" id="{25036835-1A2E-4EEA-89B8-D19FFA51D90D}"/>
+              </a:ext>
+            </a:extLst>
+          </p:cNvPr>
+          <p:cNvSpPr/>
+          <p:nvPr/>
+        </p:nvSpPr>
+        <p:spPr>
+          <a:xfrm>
+            <a:off x="7221352" y="3396506"/>
+            <a:ext cx="1707419" cy="1043873"/>
+          </a:xfrm>
+          <a:prstGeom prst="roundRect">
+            <a:avLst/>
+          </a:prstGeom>
+        </p:spPr>
+        <p:style>
+          <a:lnRef idx="2">
+            <a:schemeClr val="accent1"/>
+          </a:lnRef>
+          <a:fillRef idx="1">
+            <a:schemeClr val="lt1"/>
+          </a:fillRef>
+          <a:effectRef idx="0">
+            <a:schemeClr val="accent1"/>
+          </a:effectRef>
+          <a:fontRef idx="minor">
+            <a:schemeClr val="dk1"/>
+          </a:fontRef>
+        </p:style>
+        <p:txBody>
+          <a:bodyPr rtlCol="0" anchor="ctr"/>
+          <a:lstStyle/>
+          <a:p>
+            <a:pPr algn="ctr"/>
+            <a:r>
+              <a:rPr lang="en-US" dirty="0" err="1"/>
+              <a:t>DOSXYZnrc</a:t>
+            </a:r>
+            <a:endParaRPr lang="en-US" dirty="0"/>
+          </a:p>
+        </p:txBody>
+      </p:sp>
+      <p:sp>
+        <p:nvSpPr>
+          <p:cNvPr id="6" name="Rectangle: Rounded Corners 5">
+            <a:extLst>
+              <a:ext uri="{FF2B5EF4-FFF2-40B4-BE49-F238E27FC236}">
+                <a16:creationId xmlns:a16="http://schemas.microsoft.com/office/drawing/2014/main" id="{4D22A841-E144-4816-A401-98D5A4B53B60}"/>
+              </a:ext>
+            </a:extLst>
+          </p:cNvPr>
+          <p:cNvSpPr/>
+          <p:nvPr/>
+        </p:nvSpPr>
+        <p:spPr>
+          <a:xfrm>
+            <a:off x="2717121" y="3396506"/>
+            <a:ext cx="1707419" cy="1043873"/>
+          </a:xfrm>
+          <a:prstGeom prst="roundRect">
+            <a:avLst/>
+          </a:prstGeom>
+        </p:spPr>
+        <p:style>
+          <a:lnRef idx="2">
+            <a:schemeClr val="accent1"/>
+          </a:lnRef>
+          <a:fillRef idx="1">
+            <a:schemeClr val="lt1"/>
+          </a:fillRef>
+          <a:effectRef idx="0">
+            <a:schemeClr val="accent1"/>
+          </a:effectRef>
+          <a:fontRef idx="minor">
+            <a:schemeClr val="dk1"/>
+          </a:fontRef>
+        </p:style>
+        <p:txBody>
+          <a:bodyPr rtlCol="0" anchor="ctr"/>
+          <a:lstStyle/>
+          <a:p>
+            <a:pPr algn="ctr"/>
+            <a:r>
+              <a:rPr lang="en-US" dirty="0" err="1"/>
+              <a:t>ctcreate</a:t>
+            </a:r>
+            <a:endParaRPr lang="en-US" dirty="0"/>
+          </a:p>
+        </p:txBody>
+      </p:sp>
+      <p:sp>
+        <p:nvSpPr>
+          <p:cNvPr id="7" name="Cylinder 6">
+            <a:extLst>
+              <a:ext uri="{FF2B5EF4-FFF2-40B4-BE49-F238E27FC236}">
+                <a16:creationId xmlns:a16="http://schemas.microsoft.com/office/drawing/2014/main" id="{74DBA222-DE92-4C70-AC00-620A49BD8777}"/>
+              </a:ext>
+            </a:extLst>
+          </p:cNvPr>
+          <p:cNvSpPr/>
+          <p:nvPr/>
+        </p:nvSpPr>
+        <p:spPr>
+          <a:xfrm>
+            <a:off x="757163" y="1658418"/>
+            <a:ext cx="1123108" cy="1216152"/>
+          </a:xfrm>
+          <a:prstGeom prst="can">
+            <a:avLst/>
+          </a:prstGeom>
+        </p:spPr>
+        <p:style>
+          <a:lnRef idx="2">
+            <a:schemeClr val="accent2"/>
+          </a:lnRef>
+          <a:fillRef idx="1">
+            <a:schemeClr val="lt1"/>
+          </a:fillRef>
+          <a:effectRef idx="0">
+            <a:schemeClr val="accent2"/>
+          </a:effectRef>
+          <a:fontRef idx="minor">
+            <a:schemeClr val="dk1"/>
+          </a:fontRef>
+        </p:style>
+        <p:txBody>
+          <a:bodyPr rtlCol="0" anchor="ctr"/>
+          <a:lstStyle/>
+          <a:p>
+            <a:pPr algn="ctr"/>
+            <a:r>
+              <a:rPr lang="en-US" dirty="0"/>
+              <a:t>Unit head geometry</a:t>
+            </a:r>
+          </a:p>
+        </p:txBody>
+      </p:sp>
+      <p:cxnSp>
+        <p:nvCxnSpPr>
+          <p:cNvPr id="9" name="Straight Arrow Connector 8">
+            <a:extLst>
+              <a:ext uri="{FF2B5EF4-FFF2-40B4-BE49-F238E27FC236}">
+                <a16:creationId xmlns:a16="http://schemas.microsoft.com/office/drawing/2014/main" id="{9D54BF40-2D7C-4B6D-B8F1-2B22E04DFCD0}"/>
+              </a:ext>
+            </a:extLst>
+          </p:cNvPr>
+          <p:cNvCxnSpPr>
+            <a:stCxn id="7" idx="4"/>
+            <a:endCxn id="4" idx="1"/>
+          </p:cNvCxnSpPr>
+          <p:nvPr/>
+        </p:nvCxnSpPr>
+        <p:spPr>
+          <a:xfrm>
+            <a:off x="1880271" y="2266494"/>
+            <a:ext cx="836851" cy="1"/>
+          </a:xfrm>
+          <a:prstGeom prst="straightConnector1">
+            <a:avLst/>
+          </a:prstGeom>
+          <a:ln w="31750">
+            <a:tailEnd type="triangle" w="lg" len="med"/>
+          </a:ln>
+        </p:spPr>
+        <p:style>
+          <a:lnRef idx="1">
+            <a:schemeClr val="accent1"/>
+          </a:lnRef>
+          <a:fillRef idx="0">
+            <a:schemeClr val="accent1"/>
+          </a:fillRef>
+          <a:effectRef idx="0">
+            <a:schemeClr val="accent1"/>
+          </a:effectRef>
+          <a:fontRef idx="minor">
+            <a:schemeClr val="tx1"/>
+          </a:fontRef>
+        </p:style>
+      </p:cxnSp>
+      <p:sp>
+        <p:nvSpPr>
+          <p:cNvPr id="11" name="Cylinder 10">
+            <a:extLst>
+              <a:ext uri="{FF2B5EF4-FFF2-40B4-BE49-F238E27FC236}">
+                <a16:creationId xmlns:a16="http://schemas.microsoft.com/office/drawing/2014/main" id="{9F1C550B-01C9-4D96-9C7C-52ECB3042517}"/>
+              </a:ext>
+            </a:extLst>
+          </p:cNvPr>
+          <p:cNvSpPr/>
+          <p:nvPr/>
+        </p:nvSpPr>
+        <p:spPr>
+          <a:xfrm>
+            <a:off x="5261392" y="1658418"/>
+            <a:ext cx="1123108" cy="1216152"/>
+          </a:xfrm>
+          <a:prstGeom prst="can">
+            <a:avLst/>
+          </a:prstGeom>
+        </p:spPr>
+        <p:style>
+          <a:lnRef idx="2">
+            <a:schemeClr val="accent6"/>
+          </a:lnRef>
+          <a:fillRef idx="1">
+            <a:schemeClr val="lt1"/>
+          </a:fillRef>
+          <a:effectRef idx="0">
+            <a:schemeClr val="accent6"/>
+          </a:effectRef>
+          <a:fontRef idx="minor">
+            <a:schemeClr val="dk1"/>
+          </a:fontRef>
+        </p:style>
+        <p:txBody>
+          <a:bodyPr rtlCol="0" anchor="ctr"/>
+          <a:lstStyle/>
+          <a:p>
+            <a:pPr algn="ctr"/>
+            <a:r>
+              <a:rPr lang="en-US" dirty="0"/>
+              <a:t>Phase space</a:t>
+            </a:r>
+          </a:p>
+        </p:txBody>
+      </p:sp>
+      <p:cxnSp>
+        <p:nvCxnSpPr>
+          <p:cNvPr id="12" name="Straight Arrow Connector 11">
+            <a:extLst>
+              <a:ext uri="{FF2B5EF4-FFF2-40B4-BE49-F238E27FC236}">
+                <a16:creationId xmlns:a16="http://schemas.microsoft.com/office/drawing/2014/main" id="{89EDA494-4457-4666-A324-5B6CC1AA7137}"/>
+              </a:ext>
+            </a:extLst>
+          </p:cNvPr>
+          <p:cNvCxnSpPr>
+            <a:cxnSpLocks/>
+            <a:stCxn id="4" idx="3"/>
+            <a:endCxn id="11" idx="2"/>
+          </p:cNvCxnSpPr>
+          <p:nvPr/>
+        </p:nvCxnSpPr>
+        <p:spPr>
+          <a:xfrm flipV="1">
+            <a:off x="4424541" y="2266494"/>
+            <a:ext cx="836851" cy="1"/>
+          </a:xfrm>
+          <a:prstGeom prst="straightConnector1">
+            <a:avLst/>
+          </a:prstGeom>
+          <a:ln w="31750">
+            <a:tailEnd type="triangle" w="lg" len="med"/>
+          </a:ln>
+        </p:spPr>
+        <p:style>
+          <a:lnRef idx="1">
+            <a:schemeClr val="accent1"/>
+          </a:lnRef>
+          <a:fillRef idx="0">
+            <a:schemeClr val="accent1"/>
+          </a:fillRef>
+          <a:effectRef idx="0">
+            <a:schemeClr val="accent1"/>
+          </a:effectRef>
+          <a:fontRef idx="minor">
+            <a:schemeClr val="tx1"/>
+          </a:fontRef>
+        </p:style>
+      </p:cxnSp>
+      <p:sp>
+        <p:nvSpPr>
+          <p:cNvPr id="16" name="Cylinder 15">
+            <a:extLst>
+              <a:ext uri="{FF2B5EF4-FFF2-40B4-BE49-F238E27FC236}">
+                <a16:creationId xmlns:a16="http://schemas.microsoft.com/office/drawing/2014/main" id="{985E15B6-DACD-4D11-836F-E3BC3AF37BD2}"/>
+              </a:ext>
+            </a:extLst>
+          </p:cNvPr>
+          <p:cNvSpPr/>
+          <p:nvPr/>
+        </p:nvSpPr>
+        <p:spPr>
+          <a:xfrm>
+            <a:off x="5261392" y="3310366"/>
+            <a:ext cx="1123108" cy="1216152"/>
+          </a:xfrm>
+          <a:prstGeom prst="can">
+            <a:avLst/>
+          </a:prstGeom>
+        </p:spPr>
+        <p:style>
+          <a:lnRef idx="2">
+            <a:schemeClr val="accent6"/>
+          </a:lnRef>
+          <a:fillRef idx="1">
+            <a:schemeClr val="lt1"/>
+          </a:fillRef>
+          <a:effectRef idx="0">
+            <a:schemeClr val="accent6"/>
+          </a:effectRef>
+          <a:fontRef idx="minor">
+            <a:schemeClr val="dk1"/>
+          </a:fontRef>
+        </p:style>
+        <p:txBody>
+          <a:bodyPr rtlCol="0" anchor="ctr"/>
+          <a:lstStyle/>
+          <a:p>
+            <a:pPr algn="ctr"/>
+            <a:r>
+              <a:rPr lang="en-US" dirty="0"/>
+              <a:t>Phantom</a:t>
+            </a:r>
+          </a:p>
+        </p:txBody>
+      </p:sp>
+      <p:cxnSp>
+        <p:nvCxnSpPr>
+          <p:cNvPr id="17" name="Straight Arrow Connector 16">
+            <a:extLst>
+              <a:ext uri="{FF2B5EF4-FFF2-40B4-BE49-F238E27FC236}">
+                <a16:creationId xmlns:a16="http://schemas.microsoft.com/office/drawing/2014/main" id="{7FC1E401-A5C0-4376-8A4E-8C6BDDDB0BB3}"/>
+              </a:ext>
+            </a:extLst>
+          </p:cNvPr>
+          <p:cNvCxnSpPr>
+            <a:cxnSpLocks/>
+            <a:stCxn id="6" idx="3"/>
+            <a:endCxn id="16" idx="2"/>
+          </p:cNvCxnSpPr>
+          <p:nvPr/>
+        </p:nvCxnSpPr>
+        <p:spPr>
+          <a:xfrm flipV="1">
+            <a:off x="4424540" y="3918442"/>
+            <a:ext cx="836852" cy="1"/>
+          </a:xfrm>
+          <a:prstGeom prst="straightConnector1">
+            <a:avLst/>
+          </a:prstGeom>
+          <a:ln w="31750">
+            <a:tailEnd type="triangle" w="lg" len="med"/>
+          </a:ln>
+        </p:spPr>
+        <p:style>
+          <a:lnRef idx="1">
+            <a:schemeClr val="accent1"/>
+          </a:lnRef>
+          <a:fillRef idx="0">
+            <a:schemeClr val="accent1"/>
+          </a:fillRef>
+          <a:effectRef idx="0">
+            <a:schemeClr val="accent1"/>
+          </a:effectRef>
+          <a:fontRef idx="minor">
+            <a:schemeClr val="tx1"/>
+          </a:fontRef>
+        </p:style>
+      </p:cxnSp>
+      <p:sp>
+        <p:nvSpPr>
+          <p:cNvPr id="20" name="Cylinder 19">
+            <a:extLst>
+              <a:ext uri="{FF2B5EF4-FFF2-40B4-BE49-F238E27FC236}">
+                <a16:creationId xmlns:a16="http://schemas.microsoft.com/office/drawing/2014/main" id="{35D0AFB9-CDE2-4A37-9647-953F0CF27B72}"/>
+              </a:ext>
+            </a:extLst>
+          </p:cNvPr>
+          <p:cNvSpPr/>
+          <p:nvPr/>
+        </p:nvSpPr>
+        <p:spPr>
+          <a:xfrm>
+            <a:off x="767444" y="3310366"/>
+            <a:ext cx="1123108" cy="1216152"/>
+          </a:xfrm>
+          <a:prstGeom prst="can">
+            <a:avLst/>
+          </a:prstGeom>
+        </p:spPr>
+        <p:style>
+          <a:lnRef idx="2">
+            <a:schemeClr val="accent2"/>
+          </a:lnRef>
+          <a:fillRef idx="1">
+            <a:schemeClr val="lt1"/>
+          </a:fillRef>
+          <a:effectRef idx="0">
+            <a:schemeClr val="accent2"/>
+          </a:effectRef>
+          <a:fontRef idx="minor">
+            <a:schemeClr val="dk1"/>
+          </a:fontRef>
+        </p:style>
+        <p:txBody>
+          <a:bodyPr rtlCol="0" anchor="ctr"/>
+          <a:lstStyle/>
+          <a:p>
+            <a:pPr algn="ctr"/>
+            <a:r>
+              <a:rPr lang="en-US" dirty="0"/>
+              <a:t>CT</a:t>
+            </a:r>
+          </a:p>
+        </p:txBody>
+      </p:sp>
+      <p:cxnSp>
+        <p:nvCxnSpPr>
+          <p:cNvPr id="22" name="Straight Arrow Connector 21">
+            <a:extLst>
+              <a:ext uri="{FF2B5EF4-FFF2-40B4-BE49-F238E27FC236}">
+                <a16:creationId xmlns:a16="http://schemas.microsoft.com/office/drawing/2014/main" id="{660DB3A7-502C-4A69-B398-478713C5AF18}"/>
+              </a:ext>
+            </a:extLst>
+          </p:cNvPr>
+          <p:cNvCxnSpPr>
+            <a:cxnSpLocks/>
+            <a:stCxn id="20" idx="4"/>
+            <a:endCxn id="6" idx="1"/>
+          </p:cNvCxnSpPr>
+          <p:nvPr/>
+        </p:nvCxnSpPr>
+        <p:spPr>
+          <a:xfrm>
+            <a:off x="1890552" y="3918442"/>
+            <a:ext cx="826569" cy="1"/>
+          </a:xfrm>
+          <a:prstGeom prst="straightConnector1">
+            <a:avLst/>
+          </a:prstGeom>
+          <a:ln w="31750">
+            <a:tailEnd type="triangle" w="lg" len="med"/>
+          </a:ln>
+        </p:spPr>
+        <p:style>
+          <a:lnRef idx="1">
+            <a:schemeClr val="accent1"/>
+          </a:lnRef>
+          <a:fillRef idx="0">
+            <a:schemeClr val="accent1"/>
+          </a:fillRef>
+          <a:effectRef idx="0">
+            <a:schemeClr val="accent1"/>
+          </a:effectRef>
+          <a:fontRef idx="minor">
+            <a:schemeClr val="tx1"/>
+          </a:fontRef>
+        </p:style>
+      </p:cxnSp>
+      <p:cxnSp>
+        <p:nvCxnSpPr>
+          <p:cNvPr id="25" name="Straight Arrow Connector 24">
+            <a:extLst>
+              <a:ext uri="{FF2B5EF4-FFF2-40B4-BE49-F238E27FC236}">
+                <a16:creationId xmlns:a16="http://schemas.microsoft.com/office/drawing/2014/main" id="{15ED9ECB-EA01-4D4C-9616-2A62E2DF32E6}"/>
+              </a:ext>
+            </a:extLst>
+          </p:cNvPr>
+          <p:cNvCxnSpPr>
+            <a:cxnSpLocks/>
+            <a:stCxn id="16" idx="4"/>
+            <a:endCxn id="5" idx="1"/>
+          </p:cNvCxnSpPr>
+          <p:nvPr/>
+        </p:nvCxnSpPr>
+        <p:spPr>
+          <a:xfrm>
+            <a:off x="6384500" y="3918442"/>
+            <a:ext cx="836852" cy="1"/>
+          </a:xfrm>
+          <a:prstGeom prst="straightConnector1">
+            <a:avLst/>
+          </a:prstGeom>
+          <a:ln w="31750">
+            <a:tailEnd type="triangle" w="lg" len="med"/>
+          </a:ln>
+        </p:spPr>
+        <p:style>
+          <a:lnRef idx="1">
+            <a:schemeClr val="accent1"/>
+          </a:lnRef>
+          <a:fillRef idx="0">
+            <a:schemeClr val="accent1"/>
+          </a:fillRef>
+          <a:effectRef idx="0">
+            <a:schemeClr val="accent1"/>
+          </a:effectRef>
+          <a:fontRef idx="minor">
+            <a:schemeClr val="tx1"/>
+          </a:fontRef>
+        </p:style>
+      </p:cxnSp>
+      <p:sp>
+        <p:nvSpPr>
+          <p:cNvPr id="28" name="Cylinder 27">
+            <a:extLst>
+              <a:ext uri="{FF2B5EF4-FFF2-40B4-BE49-F238E27FC236}">
+                <a16:creationId xmlns:a16="http://schemas.microsoft.com/office/drawing/2014/main" id="{B8B996AA-C1E2-4014-B007-BF05AF810641}"/>
+              </a:ext>
+            </a:extLst>
+          </p:cNvPr>
+          <p:cNvSpPr/>
+          <p:nvPr/>
+        </p:nvSpPr>
+        <p:spPr>
+          <a:xfrm>
+            <a:off x="7513508" y="5162754"/>
+            <a:ext cx="1123108" cy="1216152"/>
+          </a:xfrm>
+          <a:prstGeom prst="can">
+            <a:avLst/>
+          </a:prstGeom>
+        </p:spPr>
+        <p:style>
+          <a:lnRef idx="2">
+            <a:schemeClr val="accent2"/>
+          </a:lnRef>
+          <a:fillRef idx="1">
+            <a:schemeClr val="lt1"/>
+          </a:fillRef>
+          <a:effectRef idx="0">
+            <a:schemeClr val="accent2"/>
+          </a:effectRef>
+          <a:fontRef idx="minor">
+            <a:schemeClr val="dk1"/>
+          </a:fontRef>
+        </p:style>
+        <p:txBody>
+          <a:bodyPr rtlCol="0" anchor="ctr"/>
+          <a:lstStyle/>
+          <a:p>
+            <a:pPr algn="ctr"/>
+            <a:r>
+              <a:rPr lang="en-US" dirty="0"/>
+              <a:t>Beam geometry</a:t>
+            </a:r>
+          </a:p>
+        </p:txBody>
+      </p:sp>
+      <p:cxnSp>
+        <p:nvCxnSpPr>
+          <p:cNvPr id="29" name="Straight Arrow Connector 28">
+            <a:extLst>
+              <a:ext uri="{FF2B5EF4-FFF2-40B4-BE49-F238E27FC236}">
+                <a16:creationId xmlns:a16="http://schemas.microsoft.com/office/drawing/2014/main" id="{E18BB654-B40E-4BC5-B333-EB75072B362D}"/>
+              </a:ext>
+            </a:extLst>
+          </p:cNvPr>
+          <p:cNvCxnSpPr>
+            <a:cxnSpLocks/>
+            <a:stCxn id="28" idx="1"/>
+            <a:endCxn id="5" idx="2"/>
+          </p:cNvCxnSpPr>
+          <p:nvPr/>
+        </p:nvCxnSpPr>
+        <p:spPr>
+          <a:xfrm flipV="1">
+            <a:off x="8075062" y="4440379"/>
+            <a:ext cx="0" cy="722375"/>
+          </a:xfrm>
+          <a:prstGeom prst="straightConnector1">
+            <a:avLst/>
+          </a:prstGeom>
+          <a:ln w="31750">
+            <a:tailEnd type="triangle" w="lg" len="med"/>
+          </a:ln>
+        </p:spPr>
+        <p:style>
+          <a:lnRef idx="1">
+            <a:schemeClr val="accent1"/>
+          </a:lnRef>
+          <a:fillRef idx="0">
+            <a:schemeClr val="accent1"/>
+          </a:fillRef>
+          <a:effectRef idx="0">
+            <a:schemeClr val="accent1"/>
+          </a:effectRef>
+          <a:fontRef idx="minor">
+            <a:schemeClr val="tx1"/>
+          </a:fontRef>
+        </p:style>
+      </p:cxnSp>
+      <p:sp>
+        <p:nvSpPr>
+          <p:cNvPr id="32" name="Cylinder 31">
+            <a:extLst>
+              <a:ext uri="{FF2B5EF4-FFF2-40B4-BE49-F238E27FC236}">
+                <a16:creationId xmlns:a16="http://schemas.microsoft.com/office/drawing/2014/main" id="{950A6C7C-6402-4962-9FAF-31349035BF61}"/>
+              </a:ext>
+            </a:extLst>
+          </p:cNvPr>
+          <p:cNvSpPr/>
+          <p:nvPr/>
+        </p:nvSpPr>
+        <p:spPr>
+          <a:xfrm>
+            <a:off x="9765623" y="3310366"/>
+            <a:ext cx="1123108" cy="1216152"/>
+          </a:xfrm>
+          <a:prstGeom prst="can">
+            <a:avLst/>
+          </a:prstGeom>
+        </p:spPr>
+        <p:style>
+          <a:lnRef idx="2">
+            <a:schemeClr val="accent6"/>
+          </a:lnRef>
+          <a:fillRef idx="1">
+            <a:schemeClr val="lt1"/>
+          </a:fillRef>
+          <a:effectRef idx="0">
+            <a:schemeClr val="accent6"/>
+          </a:effectRef>
+          <a:fontRef idx="minor">
+            <a:schemeClr val="dk1"/>
+          </a:fontRef>
+        </p:style>
+        <p:txBody>
+          <a:bodyPr rtlCol="0" anchor="ctr"/>
+          <a:lstStyle/>
+          <a:p>
+            <a:pPr algn="ctr"/>
+            <a:r>
+              <a:rPr lang="en-US" dirty="0"/>
+              <a:t>Dose</a:t>
+            </a:r>
+          </a:p>
+          <a:p>
+            <a:pPr algn="ctr"/>
+            <a:r>
+              <a:rPr lang="en-US" dirty="0"/>
+              <a:t>(.3ddose)</a:t>
+            </a:r>
+          </a:p>
+        </p:txBody>
+      </p:sp>
+      <p:cxnSp>
+        <p:nvCxnSpPr>
+          <p:cNvPr id="33" name="Straight Arrow Connector 32">
+            <a:extLst>
+              <a:ext uri="{FF2B5EF4-FFF2-40B4-BE49-F238E27FC236}">
+                <a16:creationId xmlns:a16="http://schemas.microsoft.com/office/drawing/2014/main" id="{8F707EED-8286-4CF0-A605-B159D5274E88}"/>
+              </a:ext>
+            </a:extLst>
+          </p:cNvPr>
+          <p:cNvCxnSpPr>
+            <a:cxnSpLocks/>
+            <a:stCxn id="5" idx="3"/>
+            <a:endCxn id="32" idx="2"/>
+          </p:cNvCxnSpPr>
+          <p:nvPr/>
+        </p:nvCxnSpPr>
+        <p:spPr>
+          <a:xfrm flipV="1">
+            <a:off x="8928771" y="3918442"/>
+            <a:ext cx="836852" cy="1"/>
+          </a:xfrm>
+          <a:prstGeom prst="straightConnector1">
+            <a:avLst/>
+          </a:prstGeom>
+          <a:ln w="31750">
+            <a:tailEnd type="triangle" w="lg" len="med"/>
+          </a:ln>
+        </p:spPr>
+        <p:style>
+          <a:lnRef idx="1">
+            <a:schemeClr val="accent1"/>
+          </a:lnRef>
+          <a:fillRef idx="0">
+            <a:schemeClr val="accent1"/>
+          </a:fillRef>
+          <a:effectRef idx="0">
+            <a:schemeClr val="accent1"/>
+          </a:effectRef>
+          <a:fontRef idx="minor">
+            <a:schemeClr val="tx1"/>
+          </a:fontRef>
+        </p:style>
+      </p:cxnSp>
+      <p:cxnSp>
+        <p:nvCxnSpPr>
+          <p:cNvPr id="40" name="Straight Arrow Connector 39">
+            <a:extLst>
+              <a:ext uri="{FF2B5EF4-FFF2-40B4-BE49-F238E27FC236}">
+                <a16:creationId xmlns:a16="http://schemas.microsoft.com/office/drawing/2014/main" id="{8CA1B10E-E997-4C34-8F71-DDFB4DFED451}"/>
+              </a:ext>
+            </a:extLst>
+          </p:cNvPr>
+          <p:cNvCxnSpPr>
+            <a:cxnSpLocks/>
+            <a:stCxn id="11" idx="4"/>
+            <a:endCxn id="5" idx="0"/>
+          </p:cNvCxnSpPr>
+          <p:nvPr/>
+        </p:nvCxnSpPr>
+        <p:spPr>
+          <a:xfrm>
+            <a:off x="6384500" y="2266494"/>
+            <a:ext cx="1690562" cy="1130012"/>
+          </a:xfrm>
+          <a:prstGeom prst="straightConnector1">
+            <a:avLst/>
+          </a:prstGeom>
+          <a:ln w="31750">
+            <a:tailEnd type="triangle" w="lg" len="med"/>
+          </a:ln>
+        </p:spPr>
+        <p:style>
+          <a:lnRef idx="1">
+            <a:schemeClr val="accent1"/>
+          </a:lnRef>
+          <a:fillRef idx="0">
+            <a:schemeClr val="accent1"/>
+          </a:fillRef>
+          <a:effectRef idx="0">
+            <a:schemeClr val="accent1"/>
+          </a:effectRef>
+          <a:fontRef idx="minor">
+            <a:schemeClr val="tx1"/>
+          </a:fontRef>
+        </p:style>
+      </p:cxnSp>
+      <p:sp>
+        <p:nvSpPr>
+          <p:cNvPr id="43" name="TextBox 42">
+            <a:extLst>
+              <a:ext uri="{FF2B5EF4-FFF2-40B4-BE49-F238E27FC236}">
+                <a16:creationId xmlns:a16="http://schemas.microsoft.com/office/drawing/2014/main" id="{9405EE8E-395F-4C69-8EAD-CE66FE116C99}"/>
+              </a:ext>
+            </a:extLst>
+          </p:cNvPr>
+          <p:cNvSpPr txBox="1"/>
+          <p:nvPr/>
+        </p:nvSpPr>
+        <p:spPr>
+          <a:xfrm>
+            <a:off x="3218812" y="841292"/>
+            <a:ext cx="704039" cy="369332"/>
+          </a:xfrm>
+          <a:prstGeom prst="rect">
+            <a:avLst/>
+          </a:prstGeom>
+          <a:noFill/>
+        </p:spPr>
+        <p:txBody>
+          <a:bodyPr wrap="none" rtlCol="0">
+            <a:spAutoFit/>
+          </a:bodyPr>
+          <a:lstStyle/>
+          <a:p>
+            <a:r>
+              <a:rPr lang="en-US" dirty="0"/>
+              <a:t>Plane</a:t>
+            </a:r>
+          </a:p>
+        </p:txBody>
+      </p:sp>
+      <p:cxnSp>
+        <p:nvCxnSpPr>
+          <p:cNvPr id="44" name="Straight Arrow Connector 43">
+            <a:extLst>
+              <a:ext uri="{FF2B5EF4-FFF2-40B4-BE49-F238E27FC236}">
+                <a16:creationId xmlns:a16="http://schemas.microsoft.com/office/drawing/2014/main" id="{D1ECF56D-49F1-4319-A0F2-C8CE73F95393}"/>
+              </a:ext>
+            </a:extLst>
+          </p:cNvPr>
+          <p:cNvCxnSpPr>
+            <a:cxnSpLocks/>
+            <a:stCxn id="43" idx="2"/>
+            <a:endCxn id="4" idx="0"/>
+          </p:cNvCxnSpPr>
+          <p:nvPr/>
+        </p:nvCxnSpPr>
+        <p:spPr>
+          <a:xfrm>
+            <a:off x="3570832" y="1210624"/>
+            <a:ext cx="0" cy="533934"/>
+          </a:xfrm>
+          <a:prstGeom prst="straightConnector1">
+            <a:avLst/>
+          </a:prstGeom>
+          <a:ln w="31750">
+            <a:tailEnd type="triangle" w="lg" len="med"/>
+          </a:ln>
+        </p:spPr>
+        <p:style>
+          <a:lnRef idx="1">
+            <a:schemeClr val="accent1"/>
+          </a:lnRef>
+          <a:fillRef idx="0">
+            <a:schemeClr val="accent1"/>
+          </a:fillRef>
+          <a:effectRef idx="0">
+            <a:schemeClr val="accent1"/>
+          </a:effectRef>
+          <a:fontRef idx="minor">
+            <a:schemeClr val="tx1"/>
+          </a:fontRef>
+        </p:style>
+      </p:cxnSp>
+      <p:sp>
+        <p:nvSpPr>
+          <p:cNvPr id="2" name="TextBox 1">
+            <a:extLst>
+              <a:ext uri="{FF2B5EF4-FFF2-40B4-BE49-F238E27FC236}">
+                <a16:creationId xmlns:a16="http://schemas.microsoft.com/office/drawing/2014/main" id="{4B73A525-4E5A-4DC0-A2F3-C42F634616D4}"/>
+              </a:ext>
+            </a:extLst>
+          </p:cNvPr>
+          <p:cNvSpPr txBox="1"/>
+          <p:nvPr/>
+        </p:nvSpPr>
+        <p:spPr>
+          <a:xfrm>
+            <a:off x="3698732" y="32853"/>
+            <a:ext cx="3753528" cy="461665"/>
+          </a:xfrm>
+          <a:prstGeom prst="rect">
+            <a:avLst/>
+          </a:prstGeom>
+        </p:spPr>
+        <p:style>
+          <a:lnRef idx="2">
+            <a:schemeClr val="accent1"/>
+          </a:lnRef>
+          <a:fillRef idx="1">
+            <a:schemeClr val="lt1"/>
+          </a:fillRef>
+          <a:effectRef idx="0">
+            <a:schemeClr val="accent1"/>
+          </a:effectRef>
+          <a:fontRef idx="minor">
+            <a:schemeClr val="dk1"/>
+          </a:fontRef>
+        </p:style>
+        <p:txBody>
+          <a:bodyPr wrap="none" rtlCol="0">
+            <a:spAutoFit/>
+          </a:bodyPr>
+          <a:lstStyle/>
+          <a:p>
+            <a:r>
+              <a:rPr lang="en-US" sz="2400" dirty="0"/>
+              <a:t>Overall </a:t>
+            </a:r>
+            <a:r>
+              <a:rPr lang="en-US" sz="2400" dirty="0" err="1"/>
+              <a:t>DOSXYZnrc</a:t>
+            </a:r>
+            <a:r>
+              <a:rPr lang="en-US" sz="2400" dirty="0"/>
+              <a:t> data flow</a:t>
+            </a:r>
+          </a:p>
+        </p:txBody>
+      </p:sp>
     </p:spTree>
     <p:extLst>
       <p:ext uri="{BB962C8B-B14F-4D97-AF65-F5344CB8AC3E}">

</xml_diff>

<commit_message>
ENH: Updated orthovoltage data flow diagram (marked the components that are ready)
</commit_message>
<xml_diff>
--- a/technical/OrthovoltageRT_DataFlowDiagram.pptx
+++ b/technical/OrthovoltageRT_DataFlowDiagram.pptx
@@ -113,10 +113,6 @@
 </p:presentation>
 </file>
 
-<file path=ppt/revisionInfo.xml><?xml version="1.0" encoding="utf-8"?>
-<p1510:revInfo xmlns:a="http://schemas.openxmlformats.org/drawingml/2006/main" xmlns:r="http://schemas.openxmlformats.org/officeDocument/2006/relationships" xmlns:p1510="http://schemas.microsoft.com/office/powerpoint/2015/10/main"/>
-</file>
-
 <file path=ppt/slideLayouts/slideLayout1.xml><?xml version="1.0" encoding="utf-8"?>
 <p:sldLayout xmlns:a="http://schemas.openxmlformats.org/drawingml/2006/main" xmlns:r="http://schemas.openxmlformats.org/officeDocument/2006/relationships" xmlns:p="http://schemas.openxmlformats.org/presentationml/2006/main" type="title" preserve="1">
   <p:cSld name="Title Slide">
@@ -264,7 +260,7 @@
           <a:p>
             <a:fld id="{A3EF5248-34C8-48E4-B907-781D24C2C984}" type="datetimeFigureOut">
               <a:rPr lang="en-US" smtClean="0"/>
-              <a:t>2017-11-16</a:t>
+              <a:t>2018-02-13</a:t>
             </a:fld>
             <a:endParaRPr lang="en-US"/>
           </a:p>
@@ -462,7 +458,7 @@
           <a:p>
             <a:fld id="{A3EF5248-34C8-48E4-B907-781D24C2C984}" type="datetimeFigureOut">
               <a:rPr lang="en-US" smtClean="0"/>
-              <a:t>2017-11-16</a:t>
+              <a:t>2018-02-13</a:t>
             </a:fld>
             <a:endParaRPr lang="en-US"/>
           </a:p>
@@ -670,7 +666,7 @@
           <a:p>
             <a:fld id="{A3EF5248-34C8-48E4-B907-781D24C2C984}" type="datetimeFigureOut">
               <a:rPr lang="en-US" smtClean="0"/>
-              <a:t>2017-11-16</a:t>
+              <a:t>2018-02-13</a:t>
             </a:fld>
             <a:endParaRPr lang="en-US"/>
           </a:p>
@@ -868,7 +864,7 @@
           <a:p>
             <a:fld id="{A3EF5248-34C8-48E4-B907-781D24C2C984}" type="datetimeFigureOut">
               <a:rPr lang="en-US" smtClean="0"/>
-              <a:t>2017-11-16</a:t>
+              <a:t>2018-02-13</a:t>
             </a:fld>
             <a:endParaRPr lang="en-US"/>
           </a:p>
@@ -1143,7 +1139,7 @@
           <a:p>
             <a:fld id="{A3EF5248-34C8-48E4-B907-781D24C2C984}" type="datetimeFigureOut">
               <a:rPr lang="en-US" smtClean="0"/>
-              <a:t>2017-11-16</a:t>
+              <a:t>2018-02-13</a:t>
             </a:fld>
             <a:endParaRPr lang="en-US"/>
           </a:p>
@@ -1408,7 +1404,7 @@
           <a:p>
             <a:fld id="{A3EF5248-34C8-48E4-B907-781D24C2C984}" type="datetimeFigureOut">
               <a:rPr lang="en-US" smtClean="0"/>
-              <a:t>2017-11-16</a:t>
+              <a:t>2018-02-13</a:t>
             </a:fld>
             <a:endParaRPr lang="en-US"/>
           </a:p>
@@ -1820,7 +1816,7 @@
           <a:p>
             <a:fld id="{A3EF5248-34C8-48E4-B907-781D24C2C984}" type="datetimeFigureOut">
               <a:rPr lang="en-US" smtClean="0"/>
-              <a:t>2017-11-16</a:t>
+              <a:t>2018-02-13</a:t>
             </a:fld>
             <a:endParaRPr lang="en-US"/>
           </a:p>
@@ -1961,7 +1957,7 @@
           <a:p>
             <a:fld id="{A3EF5248-34C8-48E4-B907-781D24C2C984}" type="datetimeFigureOut">
               <a:rPr lang="en-US" smtClean="0"/>
-              <a:t>2017-11-16</a:t>
+              <a:t>2018-02-13</a:t>
             </a:fld>
             <a:endParaRPr lang="en-US"/>
           </a:p>
@@ -2074,7 +2070,7 @@
           <a:p>
             <a:fld id="{A3EF5248-34C8-48E4-B907-781D24C2C984}" type="datetimeFigureOut">
               <a:rPr lang="en-US" smtClean="0"/>
-              <a:t>2017-11-16</a:t>
+              <a:t>2018-02-13</a:t>
             </a:fld>
             <a:endParaRPr lang="en-US"/>
           </a:p>
@@ -2385,7 +2381,7 @@
           <a:p>
             <a:fld id="{A3EF5248-34C8-48E4-B907-781D24C2C984}" type="datetimeFigureOut">
               <a:rPr lang="en-US" smtClean="0"/>
-              <a:t>2017-11-16</a:t>
+              <a:t>2018-02-13</a:t>
             </a:fld>
             <a:endParaRPr lang="en-US"/>
           </a:p>
@@ -2673,7 +2669,7 @@
           <a:p>
             <a:fld id="{A3EF5248-34C8-48E4-B907-781D24C2C984}" type="datetimeFigureOut">
               <a:rPr lang="en-US" smtClean="0"/>
-              <a:t>2017-11-16</a:t>
+              <a:t>2018-02-13</a:t>
             </a:fld>
             <a:endParaRPr lang="en-US"/>
           </a:p>
@@ -2914,7 +2910,7 @@
           <a:p>
             <a:fld id="{A3EF5248-34C8-48E4-B907-781D24C2C984}" type="datetimeFigureOut">
               <a:rPr lang="en-US" smtClean="0"/>
-              <a:t>2017-11-16</a:t>
+              <a:t>2018-02-13</a:t>
             </a:fld>
             <a:endParaRPr lang="en-US"/>
           </a:p>
@@ -4459,7 +4455,7 @@
           </a:prstGeom>
           <a:ln w="31750">
             <a:solidFill>
-              <a:srgbClr val="FF0000"/>
+              <a:schemeClr val="tx1"/>
             </a:solidFill>
             <a:tailEnd type="triangle" w="lg" len="med"/>
           </a:ln>
@@ -4505,7 +4501,7 @@
           </a:prstGeom>
           <a:ln w="31750">
             <a:solidFill>
-              <a:srgbClr val="FF0000"/>
+              <a:schemeClr val="tx1"/>
             </a:solidFill>
             <a:tailEnd type="triangle" w="lg" len="med"/>
           </a:ln>
@@ -5205,58 +5201,6 @@
             <a:r>
               <a:rPr lang="en-US" sz="1400" dirty="0"/>
               <a:t>CCSEO</a:t>
-            </a:r>
-          </a:p>
-        </p:txBody>
-      </p:sp>
-      <p:sp>
-        <p:nvSpPr>
-          <p:cNvPr id="51" name="TextBox 50">
-            <a:extLst>
-              <a:ext uri="{FF2B5EF4-FFF2-40B4-BE49-F238E27FC236}">
-                <a16:creationId xmlns:a16="http://schemas.microsoft.com/office/drawing/2014/main" id="{EAE59DC8-537C-4EE4-A860-8CC929616F9C}"/>
-              </a:ext>
-            </a:extLst>
-          </p:cNvPr>
-          <p:cNvSpPr txBox="1"/>
-          <p:nvPr/>
-        </p:nvSpPr>
-        <p:spPr>
-          <a:xfrm>
-            <a:off x="3687920" y="5887751"/>
-            <a:ext cx="662746" cy="307777"/>
-          </a:xfrm>
-          <a:prstGeom prst="rect">
-            <a:avLst/>
-          </a:prstGeom>
-          <a:solidFill>
-            <a:srgbClr val="800000"/>
-          </a:solidFill>
-        </p:spPr>
-        <p:style>
-          <a:lnRef idx="0">
-            <a:schemeClr val="accent2"/>
-          </a:lnRef>
-          <a:fillRef idx="3">
-            <a:schemeClr val="accent2"/>
-          </a:fillRef>
-          <a:effectRef idx="3">
-            <a:schemeClr val="accent2"/>
-          </a:effectRef>
-          <a:fontRef idx="minor">
-            <a:schemeClr val="lt1"/>
-          </a:fontRef>
-        </p:style>
-        <p:txBody>
-          <a:bodyPr wrap="square" rtlCol="0">
-            <a:spAutoFit/>
-          </a:bodyPr>
-          <a:lstStyle/>
-          <a:p>
-            <a:pPr algn="ctr"/>
-            <a:r>
-              <a:rPr lang="en-US" sz="1400" dirty="0"/>
-              <a:t>Perk</a:t>
             </a:r>
           </a:p>
         </p:txBody>

</xml_diff>

<commit_message>
Update orthovoltage integration diagram
Integration is now finished, so tracking the tasks are not needed, only showing the components of the integration.
</commit_message>
<xml_diff>
--- a/technical/OrthovoltageRT_DataFlowDiagram.pptx
+++ b/technical/OrthovoltageRT_DataFlowDiagram.pptx
@@ -260,7 +260,7 @@
           <a:p>
             <a:fld id="{A3EF5248-34C8-48E4-B907-781D24C2C984}" type="datetimeFigureOut">
               <a:rPr lang="en-US" smtClean="0"/>
-              <a:t>2018-02-13</a:t>
+              <a:t>2019-07-10</a:t>
             </a:fld>
             <a:endParaRPr lang="en-US"/>
           </a:p>
@@ -458,7 +458,7 @@
           <a:p>
             <a:fld id="{A3EF5248-34C8-48E4-B907-781D24C2C984}" type="datetimeFigureOut">
               <a:rPr lang="en-US" smtClean="0"/>
-              <a:t>2018-02-13</a:t>
+              <a:t>2019-07-10</a:t>
             </a:fld>
             <a:endParaRPr lang="en-US"/>
           </a:p>
@@ -666,7 +666,7 @@
           <a:p>
             <a:fld id="{A3EF5248-34C8-48E4-B907-781D24C2C984}" type="datetimeFigureOut">
               <a:rPr lang="en-US" smtClean="0"/>
-              <a:t>2018-02-13</a:t>
+              <a:t>2019-07-10</a:t>
             </a:fld>
             <a:endParaRPr lang="en-US"/>
           </a:p>
@@ -864,7 +864,7 @@
           <a:p>
             <a:fld id="{A3EF5248-34C8-48E4-B907-781D24C2C984}" type="datetimeFigureOut">
               <a:rPr lang="en-US" smtClean="0"/>
-              <a:t>2018-02-13</a:t>
+              <a:t>2019-07-10</a:t>
             </a:fld>
             <a:endParaRPr lang="en-US"/>
           </a:p>
@@ -1139,7 +1139,7 @@
           <a:p>
             <a:fld id="{A3EF5248-34C8-48E4-B907-781D24C2C984}" type="datetimeFigureOut">
               <a:rPr lang="en-US" smtClean="0"/>
-              <a:t>2018-02-13</a:t>
+              <a:t>2019-07-10</a:t>
             </a:fld>
             <a:endParaRPr lang="en-US"/>
           </a:p>
@@ -1404,7 +1404,7 @@
           <a:p>
             <a:fld id="{A3EF5248-34C8-48E4-B907-781D24C2C984}" type="datetimeFigureOut">
               <a:rPr lang="en-US" smtClean="0"/>
-              <a:t>2018-02-13</a:t>
+              <a:t>2019-07-10</a:t>
             </a:fld>
             <a:endParaRPr lang="en-US"/>
           </a:p>
@@ -1816,7 +1816,7 @@
           <a:p>
             <a:fld id="{A3EF5248-34C8-48E4-B907-781D24C2C984}" type="datetimeFigureOut">
               <a:rPr lang="en-US" smtClean="0"/>
-              <a:t>2018-02-13</a:t>
+              <a:t>2019-07-10</a:t>
             </a:fld>
             <a:endParaRPr lang="en-US"/>
           </a:p>
@@ -1957,7 +1957,7 @@
           <a:p>
             <a:fld id="{A3EF5248-34C8-48E4-B907-781D24C2C984}" type="datetimeFigureOut">
               <a:rPr lang="en-US" smtClean="0"/>
-              <a:t>2018-02-13</a:t>
+              <a:t>2019-07-10</a:t>
             </a:fld>
             <a:endParaRPr lang="en-US"/>
           </a:p>
@@ -2070,7 +2070,7 @@
           <a:p>
             <a:fld id="{A3EF5248-34C8-48E4-B907-781D24C2C984}" type="datetimeFigureOut">
               <a:rPr lang="en-US" smtClean="0"/>
-              <a:t>2018-02-13</a:t>
+              <a:t>2019-07-10</a:t>
             </a:fld>
             <a:endParaRPr lang="en-US"/>
           </a:p>
@@ -2381,7 +2381,7 @@
           <a:p>
             <a:fld id="{A3EF5248-34C8-48E4-B907-781D24C2C984}" type="datetimeFigureOut">
               <a:rPr lang="en-US" smtClean="0"/>
-              <a:t>2018-02-13</a:t>
+              <a:t>2019-07-10</a:t>
             </a:fld>
             <a:endParaRPr lang="en-US"/>
           </a:p>
@@ -2669,7 +2669,7 @@
           <a:p>
             <a:fld id="{A3EF5248-34C8-48E4-B907-781D24C2C984}" type="datetimeFigureOut">
               <a:rPr lang="en-US" smtClean="0"/>
-              <a:t>2018-02-13</a:t>
+              <a:t>2019-07-10</a:t>
             </a:fld>
             <a:endParaRPr lang="en-US"/>
           </a:p>
@@ -2910,7 +2910,7 @@
           <a:p>
             <a:fld id="{A3EF5248-34C8-48E4-B907-781D24C2C984}" type="datetimeFigureOut">
               <a:rPr lang="en-US" smtClean="0"/>
-              <a:t>2018-02-13</a:t>
+              <a:t>2019-07-10</a:t>
             </a:fld>
             <a:endParaRPr lang="en-US"/>
           </a:p>
@@ -4196,7 +4196,7 @@
         <p:spPr>
           <a:xfrm>
             <a:off x="2305548" y="51961"/>
-            <a:ext cx="7091300" cy="461665"/>
+            <a:ext cx="6284669" cy="461665"/>
           </a:xfrm>
           <a:prstGeom prst="rect">
             <a:avLst/>
@@ -4223,8 +4223,12 @@
           <a:lstStyle/>
           <a:p>
             <a:r>
+              <a:rPr lang="en-US" sz="2400" dirty="0" smtClean="0"/>
+              <a:t>Integration </a:t>
+            </a:r>
+            <a:r>
               <a:rPr lang="en-US" sz="2400" dirty="0"/>
-              <a:t>Tasks (integration of </a:t>
+              <a:t>of </a:t>
             </a:r>
             <a:r>
               <a:rPr lang="en-US" sz="2400" dirty="0" err="1"/>
@@ -4232,57 +4236,13 @@
             </a:r>
             <a:r>
               <a:rPr lang="en-US" sz="2400" dirty="0"/>
-              <a:t> workflow into SlicerRT)</a:t>
-            </a:r>
-          </a:p>
-        </p:txBody>
-      </p:sp>
-      <p:sp>
-        <p:nvSpPr>
-          <p:cNvPr id="2" name="TextBox 1">
-            <a:extLst>
-              <a:ext uri="{FF2B5EF4-FFF2-40B4-BE49-F238E27FC236}">
-                <a16:creationId xmlns:a16="http://schemas.microsoft.com/office/drawing/2014/main" id="{6CE65134-BAF8-4E2E-9103-CDE0683DCC7B}"/>
-              </a:ext>
-            </a:extLst>
-          </p:cNvPr>
-          <p:cNvSpPr txBox="1"/>
-          <p:nvPr/>
-        </p:nvSpPr>
-        <p:spPr>
-          <a:xfrm>
-            <a:off x="5422017" y="1398669"/>
-            <a:ext cx="662746" cy="307777"/>
-          </a:xfrm>
-          <a:prstGeom prst="rect">
-            <a:avLst/>
-          </a:prstGeom>
-        </p:spPr>
-        <p:style>
-          <a:lnRef idx="0">
-            <a:schemeClr val="accent2"/>
-          </a:lnRef>
-          <a:fillRef idx="3">
-            <a:schemeClr val="accent2"/>
-          </a:fillRef>
-          <a:effectRef idx="3">
-            <a:schemeClr val="accent2"/>
-          </a:effectRef>
-          <a:fontRef idx="minor">
-            <a:schemeClr val="lt1"/>
-          </a:fontRef>
-        </p:style>
-        <p:txBody>
-          <a:bodyPr wrap="square" rtlCol="0">
-            <a:spAutoFit/>
-          </a:bodyPr>
-          <a:lstStyle/>
-          <a:p>
-            <a:pPr algn="ctr"/>
-            <a:r>
-              <a:rPr lang="en-US" sz="1400" dirty="0"/>
-              <a:t>CCSEO</a:t>
-            </a:r>
+              <a:t> workflow into </a:t>
+            </a:r>
+            <a:r>
+              <a:rPr lang="en-US" sz="2400" dirty="0" smtClean="0"/>
+              <a:t>SlicerRT</a:t>
+            </a:r>
+            <a:endParaRPr lang="en-US" sz="2400" dirty="0"/>
           </a:p>
         </p:txBody>
       </p:sp>
@@ -4308,7 +4268,7 @@
           </a:prstGeom>
           <a:ln w="38100">
             <a:solidFill>
-              <a:srgbClr val="FF0000"/>
+              <a:srgbClr val="800000"/>
             </a:solidFill>
           </a:ln>
         </p:spPr>
@@ -4548,7 +4508,7 @@
           </a:prstGeom>
           <a:ln w="31750">
             <a:solidFill>
-              <a:srgbClr val="FF0000"/>
+              <a:schemeClr val="tx1"/>
             </a:solidFill>
             <a:tailEnd type="triangle" w="lg" len="med"/>
           </a:ln>
@@ -4642,7 +4602,7 @@
           </a:prstGeom>
           <a:ln w="31750">
             <a:solidFill>
-              <a:srgbClr val="FF0000"/>
+              <a:schemeClr val="tx1"/>
             </a:solidFill>
             <a:tailEnd type="triangle" w="lg" len="med"/>
           </a:ln>
@@ -4704,55 +4664,6 @@
           </a:fontRef>
         </p:style>
       </p:cxnSp>
-      <p:sp>
-        <p:nvSpPr>
-          <p:cNvPr id="66" name="TextBox 65">
-            <a:extLst>
-              <a:ext uri="{FF2B5EF4-FFF2-40B4-BE49-F238E27FC236}">
-                <a16:creationId xmlns:a16="http://schemas.microsoft.com/office/drawing/2014/main" id="{2EE1C9AA-5881-4D54-9A37-B9525B43F1F2}"/>
-              </a:ext>
-            </a:extLst>
-          </p:cNvPr>
-          <p:cNvSpPr txBox="1"/>
-          <p:nvPr/>
-        </p:nvSpPr>
-        <p:spPr>
-          <a:xfrm>
-            <a:off x="8116599" y="4158542"/>
-            <a:ext cx="662746" cy="307777"/>
-          </a:xfrm>
-          <a:prstGeom prst="rect">
-            <a:avLst/>
-          </a:prstGeom>
-        </p:spPr>
-        <p:style>
-          <a:lnRef idx="0">
-            <a:schemeClr val="accent2"/>
-          </a:lnRef>
-          <a:fillRef idx="3">
-            <a:schemeClr val="accent2"/>
-          </a:fillRef>
-          <a:effectRef idx="3">
-            <a:schemeClr val="accent2"/>
-          </a:effectRef>
-          <a:fontRef idx="minor">
-            <a:schemeClr val="lt1"/>
-          </a:fontRef>
-        </p:style>
-        <p:txBody>
-          <a:bodyPr wrap="square" rtlCol="0">
-            <a:spAutoFit/>
-          </a:bodyPr>
-          <a:lstStyle/>
-          <a:p>
-            <a:pPr algn="ctr"/>
-            <a:r>
-              <a:rPr lang="en-US" sz="1400" dirty="0"/>
-              <a:t>CCSEO</a:t>
-            </a:r>
-          </a:p>
-        </p:txBody>
-      </p:sp>
       <p:cxnSp>
         <p:nvCxnSpPr>
           <p:cNvPr id="79" name="Connector: Elbow 78">
@@ -4824,7 +4735,7 @@
           </a:prstGeom>
           <a:ln w="31750">
             <a:solidFill>
-              <a:srgbClr val="FF0000"/>
+              <a:schemeClr val="tx1"/>
             </a:solidFill>
             <a:tailEnd type="triangle" w="lg" len="med"/>
           </a:ln>
@@ -4846,58 +4757,6 @@
       </p:cxnSp>
       <p:sp>
         <p:nvSpPr>
-          <p:cNvPr id="63" name="TextBox 62">
-            <a:extLst>
-              <a:ext uri="{FF2B5EF4-FFF2-40B4-BE49-F238E27FC236}">
-                <a16:creationId xmlns:a16="http://schemas.microsoft.com/office/drawing/2014/main" id="{7211B544-B9EB-4636-B898-5B68127BFAC4}"/>
-              </a:ext>
-            </a:extLst>
-          </p:cNvPr>
-          <p:cNvSpPr txBox="1"/>
-          <p:nvPr/>
-        </p:nvSpPr>
-        <p:spPr>
-          <a:xfrm>
-            <a:off x="6605914" y="5950033"/>
-            <a:ext cx="662746" cy="307777"/>
-          </a:xfrm>
-          <a:prstGeom prst="rect">
-            <a:avLst/>
-          </a:prstGeom>
-          <a:solidFill>
-            <a:srgbClr val="800000"/>
-          </a:solidFill>
-        </p:spPr>
-        <p:style>
-          <a:lnRef idx="0">
-            <a:schemeClr val="accent2"/>
-          </a:lnRef>
-          <a:fillRef idx="3">
-            <a:schemeClr val="accent2"/>
-          </a:fillRef>
-          <a:effectRef idx="3">
-            <a:schemeClr val="accent2"/>
-          </a:effectRef>
-          <a:fontRef idx="minor">
-            <a:schemeClr val="lt1"/>
-          </a:fontRef>
-        </p:style>
-        <p:txBody>
-          <a:bodyPr wrap="square" rtlCol="0">
-            <a:spAutoFit/>
-          </a:bodyPr>
-          <a:lstStyle/>
-          <a:p>
-            <a:pPr algn="ctr"/>
-            <a:r>
-              <a:rPr lang="en-US" sz="1400" dirty="0"/>
-              <a:t>Perk</a:t>
-            </a:r>
-          </a:p>
-        </p:txBody>
-      </p:sp>
-      <p:sp>
-        <p:nvSpPr>
           <p:cNvPr id="3" name="TextBox 2">
             <a:extLst>
               <a:ext uri="{FF2B5EF4-FFF2-40B4-BE49-F238E27FC236}">
@@ -5068,6 +4927,10 @@
               <a:rPr lang="en-US" sz="1200"/>
               <a:t>       Call</a:t>
             </a:r>
+            <a:r>
+              <a:rPr lang="en-US" sz="1200" dirty="0"/>
+              <a:t/>
+            </a:r>
             <a:br>
               <a:rPr lang="en-US" sz="1200" dirty="0"/>
             </a:br>
@@ -5152,55 +5015,6 @@
             <a:r>
               <a:rPr lang="en-US" sz="1200" dirty="0"/>
               <a:t>Load</a:t>
-            </a:r>
-          </a:p>
-        </p:txBody>
-      </p:sp>
-      <p:sp>
-        <p:nvSpPr>
-          <p:cNvPr id="56" name="TextBox 55">
-            <a:extLst>
-              <a:ext uri="{FF2B5EF4-FFF2-40B4-BE49-F238E27FC236}">
-                <a16:creationId xmlns:a16="http://schemas.microsoft.com/office/drawing/2014/main" id="{A4BCCB2C-2459-4E8B-B535-0BA3BBFB920A}"/>
-              </a:ext>
-            </a:extLst>
-          </p:cNvPr>
-          <p:cNvSpPr txBox="1"/>
-          <p:nvPr/>
-        </p:nvSpPr>
-        <p:spPr>
-          <a:xfrm>
-            <a:off x="1623905" y="1398668"/>
-            <a:ext cx="662746" cy="307777"/>
-          </a:xfrm>
-          <a:prstGeom prst="rect">
-            <a:avLst/>
-          </a:prstGeom>
-        </p:spPr>
-        <p:style>
-          <a:lnRef idx="0">
-            <a:schemeClr val="accent2"/>
-          </a:lnRef>
-          <a:fillRef idx="3">
-            <a:schemeClr val="accent2"/>
-          </a:fillRef>
-          <a:effectRef idx="3">
-            <a:schemeClr val="accent2"/>
-          </a:effectRef>
-          <a:fontRef idx="minor">
-            <a:schemeClr val="lt1"/>
-          </a:fontRef>
-        </p:style>
-        <p:txBody>
-          <a:bodyPr wrap="square" rtlCol="0">
-            <a:spAutoFit/>
-          </a:bodyPr>
-          <a:lstStyle/>
-          <a:p>
-            <a:pPr algn="ctr"/>
-            <a:r>
-              <a:rPr lang="en-US" sz="1400" dirty="0"/>
-              <a:t>CCSEO</a:t>
             </a:r>
           </a:p>
         </p:txBody>

</xml_diff>